<commit_message>
slides for rotation meeting, summary.
</commit_message>
<xml_diff>
--- a/Summary/20210224_demo_for_ccgb_rotation_update.pptx
+++ b/Summary/20210224_demo_for_ccgb_rotation_update.pptx
@@ -5,7 +5,7 @@
     <p:sldMasterId id="2147483648" r:id="rId1"/>
   </p:sldMasterIdLst>
   <p:notesMasterIdLst>
-    <p:notesMasterId r:id="rId20"/>
+    <p:notesMasterId r:id="rId21"/>
   </p:notesMasterIdLst>
   <p:sldIdLst>
     <p:sldId id="256" r:id="rId2"/>
@@ -24,8 +24,9 @@
     <p:sldId id="305" r:id="rId15"/>
     <p:sldId id="306" r:id="rId16"/>
     <p:sldId id="307" r:id="rId17"/>
-    <p:sldId id="278" r:id="rId18"/>
-    <p:sldId id="273" r:id="rId19"/>
+    <p:sldId id="309" r:id="rId18"/>
+    <p:sldId id="278" r:id="rId19"/>
+    <p:sldId id="273" r:id="rId20"/>
   </p:sldIdLst>
   <p:sldSz cx="12192000" cy="6858000"/>
   <p:notesSz cx="6858000" cy="9144000"/>
@@ -145,6 +146,7 @@
             <p14:sldId id="305"/>
             <p14:sldId id="306"/>
             <p14:sldId id="307"/>
+            <p14:sldId id="309"/>
             <p14:sldId id="278"/>
             <p14:sldId id="273"/>
           </p14:sldIdLst>
@@ -908,7 +910,7 @@
           <a:p>
             <a:fld id="{9D984E8B-8157-4976-ABDF-6DA2CAC3440F}" type="slidenum">
               <a:rPr lang="en-US" smtClean="0"/>
-              <a:t>17</a:t>
+              <a:t>18</a:t>
             </a:fld>
             <a:endParaRPr lang="en-US"/>
           </a:p>
@@ -4352,8 +4354,8 @@
         </p:blipFill>
         <p:spPr>
           <a:xfrm>
-            <a:off x="460887" y="1393389"/>
-            <a:ext cx="7541342" cy="3131133"/>
+            <a:off x="460887" y="1393390"/>
+            <a:ext cx="6488553" cy="2694020"/>
           </a:xfrm>
           <a:prstGeom prst="rect">
             <a:avLst/>
@@ -4376,14 +4378,14 @@
             <p:ph idx="1"/>
             <p:extLst>
               <p:ext uri="{D42A27DB-BD31-4B8C-83A1-F6EECF244321}">
-                <p14:modId xmlns:p14="http://schemas.microsoft.com/office/powerpoint/2010/main" val="319149575"/>
+                <p14:modId xmlns:p14="http://schemas.microsoft.com/office/powerpoint/2010/main" val="4205211437"/>
               </p:ext>
             </p:extLst>
           </p:nvPr>
         </p:nvGraphicFramePr>
         <p:xfrm>
-          <a:off x="838200" y="4524522"/>
-          <a:ext cx="10515600" cy="2225040"/>
+          <a:off x="838200" y="4262120"/>
+          <a:ext cx="10515600" cy="2595880"/>
         </p:xfrm>
         <a:graphic>
           <a:graphicData uri="http://schemas.openxmlformats.org/drawingml/2006/table">
@@ -4521,33 +4523,33 @@
                     <a:p>
                       <a:r>
                         <a:rPr lang="en-US" dirty="0"/>
-                        <a:t>-217.295138336</a:t>
-                      </a:r>
-                    </a:p>
-                  </a:txBody>
-                  <a:tcPr/>
-                </a:tc>
-                <a:tc>
-                  <a:txBody>
-                    <a:bodyPr/>
-                    <a:lstStyle/>
-                    <a:p>
-                      <a:r>
-                        <a:rPr lang="en-US" dirty="0"/>
-                        <a:t>-219.788922069</a:t>
-                      </a:r>
-                    </a:p>
-                  </a:txBody>
-                  <a:tcPr/>
-                </a:tc>
-                <a:tc>
-                  <a:txBody>
-                    <a:bodyPr/>
-                    <a:lstStyle/>
-                    <a:p>
-                      <a:r>
-                        <a:rPr lang="en-US" dirty="0"/>
-                        <a:t>-217.323496551</a:t>
+                        <a:t>-398.525891057</a:t>
+                      </a:r>
+                    </a:p>
+                  </a:txBody>
+                  <a:tcPr/>
+                </a:tc>
+                <a:tc>
+                  <a:txBody>
+                    <a:bodyPr/>
+                    <a:lstStyle/>
+                    <a:p>
+                      <a:r>
+                        <a:rPr lang="en-US" dirty="0"/>
+                        <a:t>-398.504467277</a:t>
+                      </a:r>
+                    </a:p>
+                  </a:txBody>
+                  <a:tcPr/>
+                </a:tc>
+                <a:tc>
+                  <a:txBody>
+                    <a:bodyPr/>
+                    <a:lstStyle/>
+                    <a:p>
+                      <a:r>
+                        <a:rPr lang="en-US" dirty="0"/>
+                        <a:t>-398.548366976</a:t>
                       </a:r>
                       <a:endParaRPr lang="en-US" dirty="0">
                         <a:highlight>
@@ -4565,7 +4567,7 @@
                     <a:p>
                       <a:r>
                         <a:rPr lang="en-US" dirty="0"/>
-                        <a:t>-219.821925537</a:t>
+                        <a:t>-398.360442864</a:t>
                       </a:r>
                       <a:endParaRPr lang="en-US" dirty="0">
                         <a:highlight>
@@ -4589,6 +4591,88 @@
                     <a:lstStyle/>
                     <a:p>
                       <a:r>
+                        <a:rPr lang="en-US" dirty="0"/>
+                        <a:t>Theta</a:t>
+                      </a:r>
+                    </a:p>
+                  </a:txBody>
+                  <a:tcPr/>
+                </a:tc>
+                <a:tc>
+                  <a:txBody>
+                    <a:bodyPr/>
+                    <a:lstStyle/>
+                    <a:p>
+                      <a:r>
+                        <a:rPr lang="en-US" dirty="0"/>
+                        <a:t>2245.34072141</a:t>
+                      </a:r>
+                    </a:p>
+                  </a:txBody>
+                  <a:tcPr/>
+                </a:tc>
+                <a:tc>
+                  <a:txBody>
+                    <a:bodyPr/>
+                    <a:lstStyle/>
+                    <a:p>
+                      <a:r>
+                        <a:rPr lang="en-US" dirty="0"/>
+                        <a:t>2245.32714396</a:t>
+                      </a:r>
+                    </a:p>
+                  </a:txBody>
+                  <a:tcPr/>
+                </a:tc>
+                <a:tc>
+                  <a:txBody>
+                    <a:bodyPr/>
+                    <a:lstStyle/>
+                    <a:p>
+                      <a:r>
+                        <a:rPr lang="en-US" dirty="0"/>
+                        <a:t>2245.35496458</a:t>
+                      </a:r>
+                      <a:endParaRPr lang="en-US" dirty="0">
+                        <a:highlight>
+                          <a:srgbClr val="FFFF00"/>
+                        </a:highlight>
+                      </a:endParaRPr>
+                    </a:p>
+                  </a:txBody>
+                  <a:tcPr/>
+                </a:tc>
+                <a:tc>
+                  <a:txBody>
+                    <a:bodyPr/>
+                    <a:lstStyle/>
+                    <a:p>
+                      <a:r>
+                        <a:rPr lang="en-US" dirty="0"/>
+                        <a:t>2245.23581918</a:t>
+                      </a:r>
+                      <a:endParaRPr lang="en-US" dirty="0">
+                        <a:highlight>
+                          <a:srgbClr val="FFFF00"/>
+                        </a:highlight>
+                      </a:endParaRPr>
+                    </a:p>
+                  </a:txBody>
+                  <a:tcPr/>
+                </a:tc>
+                <a:extLst>
+                  <a:ext uri="{0D108BD9-81ED-4DB2-BD59-A6C34878D82A}">
+                    <a16:rowId xmlns:a16="http://schemas.microsoft.com/office/drawing/2014/main" val="106821707"/>
+                  </a:ext>
+                </a:extLst>
+              </a:tr>
+              <a:tr h="370840">
+                <a:tc>
+                  <a:txBody>
+                    <a:bodyPr/>
+                    <a:lstStyle/>
+                    <a:p>
+                      <a:r>
                         <a:rPr lang="en-US" dirty="0" err="1"/>
                         <a:t>Nu_a</a:t>
                       </a:r>
@@ -4604,46 +4688,46 @@
                     <a:p>
                       <a:r>
                         <a:rPr lang="en-US" dirty="0"/>
-                        <a:t>6.69551901</a:t>
-                      </a:r>
-                    </a:p>
-                  </a:txBody>
-                  <a:tcPr/>
-                </a:tc>
-                <a:tc>
-                  <a:txBody>
-                    <a:bodyPr/>
-                    <a:lstStyle/>
-                    <a:p>
-                      <a:r>
-                        <a:rPr lang="en-US" dirty="0"/>
-                        <a:t>2.80634262</a:t>
-                      </a:r>
-                    </a:p>
-                  </a:txBody>
-                  <a:tcPr/>
-                </a:tc>
-                <a:tc>
-                  <a:txBody>
-                    <a:bodyPr/>
-                    <a:lstStyle/>
-                    <a:p>
-                      <a:r>
-                        <a:rPr lang="en-US" dirty="0"/>
-                        <a:t>1.39324194</a:t>
-                      </a:r>
-                    </a:p>
-                  </a:txBody>
-                  <a:tcPr/>
-                </a:tc>
-                <a:tc>
-                  <a:txBody>
-                    <a:bodyPr/>
-                    <a:lstStyle/>
-                    <a:p>
-                      <a:r>
-                        <a:rPr lang="en-US" dirty="0"/>
-                        <a:t>0.13057176</a:t>
+                        <a:t>2.19215992e+00</a:t>
+                      </a:r>
+                    </a:p>
+                  </a:txBody>
+                  <a:tcPr/>
+                </a:tc>
+                <a:tc>
+                  <a:txBody>
+                    <a:bodyPr/>
+                    <a:lstStyle/>
+                    <a:p>
+                      <a:r>
+                        <a:rPr lang="en-US" dirty="0"/>
+                        <a:t>4.89667174e+00</a:t>
+                      </a:r>
+                    </a:p>
+                  </a:txBody>
+                  <a:tcPr/>
+                </a:tc>
+                <a:tc>
+                  <a:txBody>
+                    <a:bodyPr/>
+                    <a:lstStyle/>
+                    <a:p>
+                      <a:r>
+                        <a:rPr lang="en-US" dirty="0"/>
+                        <a:t>9.24711675e-02</a:t>
+                      </a:r>
+                    </a:p>
+                  </a:txBody>
+                  <a:tcPr/>
+                </a:tc>
+                <a:tc>
+                  <a:txBody>
+                    <a:bodyPr/>
+                    <a:lstStyle/>
+                    <a:p>
+                      <a:r>
+                        <a:rPr lang="en-US" dirty="0"/>
+                        <a:t>2.87729116e+00</a:t>
                       </a:r>
                     </a:p>
                   </a:txBody>
@@ -4703,20 +4787,20 @@
                     <a:p>
                       <a:r>
                         <a:rPr lang="en-US" dirty="0"/>
-                        <a:t>2.3096104</a:t>
-                      </a:r>
-                    </a:p>
-                  </a:txBody>
-                  <a:tcPr/>
-                </a:tc>
-                <a:tc>
-                  <a:txBody>
-                    <a:bodyPr/>
-                    <a:lstStyle/>
-                    <a:p>
-                      <a:r>
-                        <a:rPr lang="en-US" dirty="0"/>
-                        <a:t>0.64729155</a:t>
+                        <a:t>1.00960582e+00</a:t>
+                      </a:r>
+                    </a:p>
+                  </a:txBody>
+                  <a:tcPr/>
+                </a:tc>
+                <a:tc>
+                  <a:txBody>
+                    <a:bodyPr/>
+                    <a:lstStyle/>
+                    <a:p>
+                      <a:r>
+                        <a:rPr lang="en-US" dirty="0"/>
+                        <a:t>9.55869498e-01</a:t>
                       </a:r>
                     </a:p>
                   </a:txBody>
@@ -4749,46 +4833,46 @@
                     <a:p>
                       <a:r>
                         <a:rPr lang="en-US" dirty="0"/>
-                        <a:t>17.29658449</a:t>
-                      </a:r>
-                    </a:p>
-                  </a:txBody>
-                  <a:tcPr/>
-                </a:tc>
-                <a:tc>
-                  <a:txBody>
-                    <a:bodyPr/>
-                    <a:lstStyle/>
-                    <a:p>
-                      <a:r>
-                        <a:rPr lang="en-US" dirty="0"/>
-                        <a:t>2.15350674</a:t>
-                      </a:r>
-                    </a:p>
-                  </a:txBody>
-                  <a:tcPr/>
-                </a:tc>
-                <a:tc>
-                  <a:txBody>
-                    <a:bodyPr/>
-                    <a:lstStyle/>
-                    <a:p>
-                      <a:r>
-                        <a:rPr lang="en-US" dirty="0"/>
-                        <a:t>1.68463977</a:t>
-                      </a:r>
-                    </a:p>
-                  </a:txBody>
-                  <a:tcPr/>
-                </a:tc>
-                <a:tc>
-                  <a:txBody>
-                    <a:bodyPr/>
-                    <a:lstStyle/>
-                    <a:p>
-                      <a:r>
-                        <a:rPr lang="en-US" dirty="0"/>
-                        <a:t>0.29392339</a:t>
+                        <a:t>1.48526959e-06</a:t>
+                      </a:r>
+                    </a:p>
+                  </a:txBody>
+                  <a:tcPr/>
+                </a:tc>
+                <a:tc>
+                  <a:txBody>
+                    <a:bodyPr/>
+                    <a:lstStyle/>
+                    <a:p>
+                      <a:r>
+                        <a:rPr lang="en-US" dirty="0"/>
+                        <a:t>1.99307987e-06</a:t>
+                      </a:r>
+                    </a:p>
+                  </a:txBody>
+                  <a:tcPr/>
+                </a:tc>
+                <a:tc>
+                  <a:txBody>
+                    <a:bodyPr/>
+                    <a:lstStyle/>
+                    <a:p>
+                      <a:r>
+                        <a:rPr lang="en-US" dirty="0"/>
+                        <a:t>1.00728327e-06</a:t>
+                      </a:r>
+                    </a:p>
+                  </a:txBody>
+                  <a:tcPr/>
+                </a:tc>
+                <a:tc>
+                  <a:txBody>
+                    <a:bodyPr/>
+                    <a:lstStyle/>
+                    <a:p>
+                      <a:r>
+                        <a:rPr lang="en-US" dirty="0"/>
+                        <a:t>1.05506926e-05</a:t>
                       </a:r>
                     </a:p>
                   </a:txBody>
@@ -4860,7 +4944,7 @@
                     <a:p>
                       <a:r>
                         <a:rPr lang="en-US" dirty="0"/>
-                        <a:t>0.50844704</a:t>
+                        <a:t>1.90954397e-06</a:t>
                       </a:r>
                     </a:p>
                   </a:txBody>
@@ -5171,14 +5255,14 @@
             <p:ph idx="1"/>
             <p:extLst>
               <p:ext uri="{D42A27DB-BD31-4B8C-83A1-F6EECF244321}">
-                <p14:modId xmlns:p14="http://schemas.microsoft.com/office/powerpoint/2010/main" val="3706295191"/>
+                <p14:modId xmlns:p14="http://schemas.microsoft.com/office/powerpoint/2010/main" val="1698571128"/>
               </p:ext>
             </p:extLst>
           </p:nvPr>
         </p:nvGraphicFramePr>
         <p:xfrm>
-          <a:off x="838200" y="4539094"/>
-          <a:ext cx="10515600" cy="2225040"/>
+          <a:off x="838200" y="4015679"/>
+          <a:ext cx="10515600" cy="2595880"/>
         </p:xfrm>
         <a:graphic>
           <a:graphicData uri="http://schemas.openxmlformats.org/drawingml/2006/table">
@@ -5316,20 +5400,20 @@
                     <a:p>
                       <a:r>
                         <a:rPr lang="en-US" dirty="0"/>
-                        <a:t>-205.765950246</a:t>
-                      </a:r>
-                    </a:p>
-                  </a:txBody>
-                  <a:tcPr/>
-                </a:tc>
-                <a:tc>
-                  <a:txBody>
-                    <a:bodyPr/>
-                    <a:lstStyle/>
-                    <a:p>
-                      <a:r>
-                        <a:rPr lang="en-US" dirty="0"/>
-                        <a:t>-195.375739908</a:t>
+                        <a:t>-853.371861584</a:t>
+                      </a:r>
+                    </a:p>
+                  </a:txBody>
+                  <a:tcPr/>
+                </a:tc>
+                <a:tc>
+                  <a:txBody>
+                    <a:bodyPr/>
+                    <a:lstStyle/>
+                    <a:p>
+                      <a:r>
+                        <a:rPr lang="en-US" dirty="0"/>
+                        <a:t>-853.427262767</a:t>
                       </a:r>
                       <a:endParaRPr lang="en-US" dirty="0">
                         <a:highlight>
@@ -5347,7 +5431,7 @@
                     <a:p>
                       <a:r>
                         <a:rPr lang="en-US" dirty="0"/>
-                        <a:t>-195.963644837</a:t>
+                        <a:t>-853.178639906</a:t>
                       </a:r>
                       <a:endParaRPr lang="en-US" dirty="0">
                         <a:highlight>
@@ -5365,7 +5449,7 @@
                     <a:p>
                       <a:r>
                         <a:rPr lang="en-US" dirty="0"/>
-                        <a:t>-195.048421331</a:t>
+                        <a:t>-853.245715963</a:t>
                       </a:r>
                     </a:p>
                   </a:txBody>
@@ -5384,6 +5468,88 @@
                     <a:lstStyle/>
                     <a:p>
                       <a:r>
+                        <a:rPr lang="en-US" dirty="0"/>
+                        <a:t>Theta</a:t>
+                      </a:r>
+                    </a:p>
+                  </a:txBody>
+                  <a:tcPr/>
+                </a:tc>
+                <a:tc>
+                  <a:txBody>
+                    <a:bodyPr/>
+                    <a:lstStyle/>
+                    <a:p>
+                      <a:r>
+                        <a:rPr lang="en-US" dirty="0"/>
+                        <a:t>11538.0213712</a:t>
+                      </a:r>
+                    </a:p>
+                  </a:txBody>
+                  <a:tcPr/>
+                </a:tc>
+                <a:tc>
+                  <a:txBody>
+                    <a:bodyPr/>
+                    <a:lstStyle/>
+                    <a:p>
+                      <a:r>
+                        <a:rPr lang="en-US" dirty="0"/>
+                        <a:t>11538.0869002</a:t>
+                      </a:r>
+                      <a:endParaRPr lang="en-US" dirty="0">
+                        <a:highlight>
+                          <a:srgbClr val="FFFF00"/>
+                        </a:highlight>
+                      </a:endParaRPr>
+                    </a:p>
+                  </a:txBody>
+                  <a:tcPr/>
+                </a:tc>
+                <a:tc>
+                  <a:txBody>
+                    <a:bodyPr/>
+                    <a:lstStyle/>
+                    <a:p>
+                      <a:r>
+                        <a:rPr lang="en-US" dirty="0"/>
+                        <a:t>11537.7927562</a:t>
+                      </a:r>
+                      <a:endParaRPr lang="en-US" dirty="0">
+                        <a:highlight>
+                          <a:srgbClr val="FFFF00"/>
+                        </a:highlight>
+                      </a:endParaRPr>
+                    </a:p>
+                  </a:txBody>
+                  <a:tcPr/>
+                </a:tc>
+                <a:tc>
+                  <a:txBody>
+                    <a:bodyPr/>
+                    <a:lstStyle/>
+                    <a:p>
+                      <a:r>
+                        <a:rPr lang="en-US" dirty="0"/>
+                        <a:t>11537.872127</a:t>
+                      </a:r>
+                    </a:p>
+                  </a:txBody>
+                  <a:tcPr/>
+                </a:tc>
+                <a:extLst>
+                  <a:ext uri="{0D108BD9-81ED-4DB2-BD59-A6C34878D82A}">
+                    <a16:rowId xmlns:a16="http://schemas.microsoft.com/office/drawing/2014/main" val="364315768"/>
+                  </a:ext>
+                </a:extLst>
+              </a:tr>
+              <a:tr h="370840">
+                <a:tc>
+                  <a:txBody>
+                    <a:bodyPr/>
+                    <a:lstStyle/>
+                    <a:p>
+                      <a:r>
                         <a:rPr lang="en-US" dirty="0" err="1"/>
                         <a:t>Nu_a</a:t>
                       </a:r>
@@ -5399,46 +5565,46 @@
                     <a:p>
                       <a:r>
                         <a:rPr lang="en-US" dirty="0"/>
-                        <a:t>7.31029292</a:t>
-                      </a:r>
-                    </a:p>
-                  </a:txBody>
-                  <a:tcPr/>
-                </a:tc>
-                <a:tc>
-                  <a:txBody>
-                    <a:bodyPr/>
-                    <a:lstStyle/>
-                    <a:p>
-                      <a:r>
-                        <a:rPr lang="en-US" dirty="0"/>
-                        <a:t>2.1856705</a:t>
-                      </a:r>
-                    </a:p>
-                  </a:txBody>
-                  <a:tcPr/>
-                </a:tc>
-                <a:tc>
-                  <a:txBody>
-                    <a:bodyPr/>
-                    <a:lstStyle/>
-                    <a:p>
-                      <a:r>
-                        <a:rPr lang="en-US" dirty="0"/>
-                        <a:t>1.98581751</a:t>
-                      </a:r>
-                    </a:p>
-                  </a:txBody>
-                  <a:tcPr/>
-                </a:tc>
-                <a:tc>
-                  <a:txBody>
-                    <a:bodyPr/>
-                    <a:lstStyle/>
-                    <a:p>
-                      <a:r>
-                        <a:rPr lang="en-US" dirty="0"/>
-                        <a:t>5.67294569</a:t>
+                        <a:t>4.62689363e+00</a:t>
+                      </a:r>
+                    </a:p>
+                  </a:txBody>
+                  <a:tcPr/>
+                </a:tc>
+                <a:tc>
+                  <a:txBody>
+                    <a:bodyPr/>
+                    <a:lstStyle/>
+                    <a:p>
+                      <a:r>
+                        <a:rPr lang="en-US" dirty="0"/>
+                        <a:t>1.63254306e+00</a:t>
+                      </a:r>
+                    </a:p>
+                  </a:txBody>
+                  <a:tcPr/>
+                </a:tc>
+                <a:tc>
+                  <a:txBody>
+                    <a:bodyPr/>
+                    <a:lstStyle/>
+                    <a:p>
+                      <a:r>
+                        <a:rPr lang="en-US" dirty="0"/>
+                        <a:t>1.31305750e-01</a:t>
+                      </a:r>
+                    </a:p>
+                  </a:txBody>
+                  <a:tcPr/>
+                </a:tc>
+                <a:tc>
+                  <a:txBody>
+                    <a:bodyPr/>
+                    <a:lstStyle/>
+                    <a:p>
+                      <a:r>
+                        <a:rPr lang="en-US" dirty="0"/>
+                        <a:t>2.28520138e+00</a:t>
                       </a:r>
                     </a:p>
                   </a:txBody>
@@ -5498,20 +5664,20 @@
                     <a:p>
                       <a:r>
                         <a:rPr lang="en-US" dirty="0"/>
-                        <a:t>1.98256884</a:t>
-                      </a:r>
-                    </a:p>
-                  </a:txBody>
-                  <a:tcPr/>
-                </a:tc>
-                <a:tc>
-                  <a:txBody>
-                    <a:bodyPr/>
-                    <a:lstStyle/>
-                    <a:p>
-                      <a:r>
-                        <a:rPr lang="en-US" dirty="0"/>
-                        <a:t>9.43310158</a:t>
+                        <a:t>4.44904916e+00</a:t>
+                      </a:r>
+                    </a:p>
+                  </a:txBody>
+                  <a:tcPr/>
+                </a:tc>
+                <a:tc>
+                  <a:txBody>
+                    <a:bodyPr/>
+                    <a:lstStyle/>
+                    <a:p>
+                      <a:r>
+                        <a:rPr lang="en-US" dirty="0"/>
+                        <a:t>1.37899114e+00</a:t>
                       </a:r>
                     </a:p>
                   </a:txBody>
@@ -5544,46 +5710,46 @@
                     <a:p>
                       <a:r>
                         <a:rPr lang="en-US" dirty="0"/>
-                        <a:t>25.36171078</a:t>
-                      </a:r>
-                    </a:p>
-                  </a:txBody>
-                  <a:tcPr/>
-                </a:tc>
-                <a:tc>
-                  <a:txBody>
-                    <a:bodyPr/>
-                    <a:lstStyle/>
-                    <a:p>
-                      <a:r>
-                        <a:rPr lang="en-US" dirty="0"/>
-                        <a:t>1.56531566</a:t>
-                      </a:r>
-                    </a:p>
-                  </a:txBody>
-                  <a:tcPr/>
-                </a:tc>
-                <a:tc>
-                  <a:txBody>
-                    <a:bodyPr/>
-                    <a:lstStyle/>
-                    <a:p>
-                      <a:r>
-                        <a:rPr lang="en-US" dirty="0"/>
-                        <a:t>1.22253381</a:t>
-                      </a:r>
-                    </a:p>
-                  </a:txBody>
-                  <a:tcPr/>
-                </a:tc>
-                <a:tc>
-                  <a:txBody>
-                    <a:bodyPr/>
-                    <a:lstStyle/>
-                    <a:p>
-                      <a:r>
-                        <a:rPr lang="en-US" dirty="0"/>
-                        <a:t>5.84565073</a:t>
+                        <a:t>1.28315860e-06</a:t>
+                      </a:r>
+                    </a:p>
+                  </a:txBody>
+                  <a:tcPr/>
+                </a:tc>
+                <a:tc>
+                  <a:txBody>
+                    <a:bodyPr/>
+                    <a:lstStyle/>
+                    <a:p>
+                      <a:r>
+                        <a:rPr lang="en-US" dirty="0"/>
+                        <a:t>5.36187141e-07</a:t>
+                      </a:r>
+                    </a:p>
+                  </a:txBody>
+                  <a:tcPr/>
+                </a:tc>
+                <a:tc>
+                  <a:txBody>
+                    <a:bodyPr/>
+                    <a:lstStyle/>
+                    <a:p>
+                      <a:r>
+                        <a:rPr lang="en-US" dirty="0"/>
+                        <a:t>4.75653382e-06</a:t>
+                      </a:r>
+                    </a:p>
+                  </a:txBody>
+                  <a:tcPr/>
+                </a:tc>
+                <a:tc>
+                  <a:txBody>
+                    <a:bodyPr/>
+                    <a:lstStyle/>
+                    <a:p>
+                      <a:r>
+                        <a:rPr lang="en-US" dirty="0"/>
+                        <a:t>4.01988020e-06</a:t>
                       </a:r>
                     </a:p>
                   </a:txBody>
@@ -5655,7 +5821,7 @@
                     <a:p>
                       <a:r>
                         <a:rPr lang="en-US" dirty="0"/>
-                        <a:t>7.36221575</a:t>
+                        <a:t>1.73913466e-06</a:t>
                       </a:r>
                     </a:p>
                   </a:txBody>
@@ -5881,7 +6047,7 @@
                   <a:srgbClr val="FF0000"/>
                 </a:solidFill>
               </a:rPr>
-              <a:t>15</a:t>
+              <a:t>25</a:t>
             </a:r>
             <a:r>
               <a:rPr lang="en-US" dirty="0"/>
@@ -6013,14 +6179,14 @@
             <p:ph idx="1"/>
             <p:extLst>
               <p:ext uri="{D42A27DB-BD31-4B8C-83A1-F6EECF244321}">
-                <p14:modId xmlns:p14="http://schemas.microsoft.com/office/powerpoint/2010/main" val="1848870478"/>
+                <p14:modId xmlns:p14="http://schemas.microsoft.com/office/powerpoint/2010/main" val="1708238225"/>
               </p:ext>
             </p:extLst>
           </p:nvPr>
         </p:nvGraphicFramePr>
         <p:xfrm>
           <a:off x="838200" y="4431284"/>
-          <a:ext cx="10515600" cy="2225040"/>
+          <a:ext cx="10515600" cy="2595880"/>
         </p:xfrm>
         <a:graphic>
           <a:graphicData uri="http://schemas.openxmlformats.org/drawingml/2006/table">
@@ -6158,20 +6324,20 @@
                     <a:p>
                       <a:r>
                         <a:rPr lang="en-US" dirty="0"/>
-                        <a:t>-134.75824907</a:t>
-                      </a:r>
-                    </a:p>
-                  </a:txBody>
-                  <a:tcPr/>
-                </a:tc>
-                <a:tc>
-                  <a:txBody>
-                    <a:bodyPr/>
-                    <a:lstStyle/>
-                    <a:p>
-                      <a:r>
-                        <a:rPr lang="en-US" dirty="0"/>
-                        <a:t>-136.939167057</a:t>
+                        <a:t>-1823.60758717</a:t>
+                      </a:r>
+                    </a:p>
+                  </a:txBody>
+                  <a:tcPr/>
+                </a:tc>
+                <a:tc>
+                  <a:txBody>
+                    <a:bodyPr/>
+                    <a:lstStyle/>
+                    <a:p>
+                      <a:r>
+                        <a:rPr lang="en-US" dirty="0"/>
+                        <a:t>-1823.5852384</a:t>
                       </a:r>
                       <a:endParaRPr lang="en-US" dirty="0">
                         <a:highlight>
@@ -6189,7 +6355,7 @@
                     <a:p>
                       <a:r>
                         <a:rPr lang="en-US" dirty="0"/>
-                        <a:t>-134.758223864</a:t>
+                        <a:t>-1823.50716407</a:t>
                       </a:r>
                       <a:endParaRPr lang="en-US" dirty="0">
                         <a:highlight>
@@ -6207,7 +6373,7 @@
                     <a:p>
                       <a:r>
                         <a:rPr lang="en-US" dirty="0"/>
-                        <a:t>-133.877889826</a:t>
+                        <a:t>-1823.40285297</a:t>
                       </a:r>
                     </a:p>
                   </a:txBody>
@@ -6226,6 +6392,88 @@
                     <a:lstStyle/>
                     <a:p>
                       <a:r>
+                        <a:rPr lang="en-US" dirty="0"/>
+                        <a:t>Theta</a:t>
+                      </a:r>
+                    </a:p>
+                  </a:txBody>
+                  <a:tcPr/>
+                </a:tc>
+                <a:tc>
+                  <a:txBody>
+                    <a:bodyPr/>
+                    <a:lstStyle/>
+                    <a:p>
+                      <a:r>
+                        <a:rPr lang="en-US" dirty="0"/>
+                        <a:t>10273.1453565</a:t>
+                      </a:r>
+                    </a:p>
+                  </a:txBody>
+                  <a:tcPr/>
+                </a:tc>
+                <a:tc>
+                  <a:txBody>
+                    <a:bodyPr/>
+                    <a:lstStyle/>
+                    <a:p>
+                      <a:r>
+                        <a:rPr lang="en-US" dirty="0"/>
+                        <a:t>10273.1292711</a:t>
+                      </a:r>
+                      <a:endParaRPr lang="en-US" dirty="0">
+                        <a:highlight>
+                          <a:srgbClr val="FFFF00"/>
+                        </a:highlight>
+                      </a:endParaRPr>
+                    </a:p>
+                  </a:txBody>
+                  <a:tcPr/>
+                </a:tc>
+                <a:tc>
+                  <a:txBody>
+                    <a:bodyPr/>
+                    <a:lstStyle/>
+                    <a:p>
+                      <a:r>
+                        <a:rPr lang="en-US" dirty="0"/>
+                        <a:t>10273.0730759</a:t>
+                      </a:r>
+                      <a:endParaRPr lang="en-US" dirty="0">
+                        <a:highlight>
+                          <a:srgbClr val="FFFF00"/>
+                        </a:highlight>
+                      </a:endParaRPr>
+                    </a:p>
+                  </a:txBody>
+                  <a:tcPr/>
+                </a:tc>
+                <a:tc>
+                  <a:txBody>
+                    <a:bodyPr/>
+                    <a:lstStyle/>
+                    <a:p>
+                      <a:r>
+                        <a:rPr lang="en-US" dirty="0"/>
+                        <a:t>10272.9979928</a:t>
+                      </a:r>
+                    </a:p>
+                  </a:txBody>
+                  <a:tcPr/>
+                </a:tc>
+                <a:extLst>
+                  <a:ext uri="{0D108BD9-81ED-4DB2-BD59-A6C34878D82A}">
+                    <a16:rowId xmlns:a16="http://schemas.microsoft.com/office/drawing/2014/main" val="1835090049"/>
+                  </a:ext>
+                </a:extLst>
+              </a:tr>
+              <a:tr h="370840">
+                <a:tc>
+                  <a:txBody>
+                    <a:bodyPr/>
+                    <a:lstStyle/>
+                    <a:p>
+                      <a:r>
                         <a:rPr lang="en-US" dirty="0" err="1"/>
                         <a:t>Nu_a</a:t>
                       </a:r>
@@ -6241,46 +6489,46 @@
                     <a:p>
                       <a:r>
                         <a:rPr lang="en-US" dirty="0"/>
-                        <a:t>5.52070018</a:t>
-                      </a:r>
-                    </a:p>
-                  </a:txBody>
-                  <a:tcPr/>
-                </a:tc>
-                <a:tc>
-                  <a:txBody>
-                    <a:bodyPr/>
-                    <a:lstStyle/>
-                    <a:p>
-                      <a:r>
-                        <a:rPr lang="en-US" dirty="0"/>
-                        <a:t>3.96928341</a:t>
-                      </a:r>
-                    </a:p>
-                  </a:txBody>
-                  <a:tcPr/>
-                </a:tc>
-                <a:tc>
-                  <a:txBody>
-                    <a:bodyPr/>
-                    <a:lstStyle/>
-                    <a:p>
-                      <a:r>
-                        <a:rPr lang="en-US" dirty="0"/>
-                        <a:t>1.00120516</a:t>
-                      </a:r>
-                    </a:p>
-                  </a:txBody>
-                  <a:tcPr/>
-                </a:tc>
-                <a:tc>
-                  <a:txBody>
-                    <a:bodyPr/>
-                    <a:lstStyle/>
-                    <a:p>
-                      <a:r>
-                        <a:rPr lang="en-US" dirty="0"/>
-                        <a:t>1.69793265</a:t>
+                        <a:t>1.63059704e+00</a:t>
+                      </a:r>
+                    </a:p>
+                  </a:txBody>
+                  <a:tcPr/>
+                </a:tc>
+                <a:tc>
+                  <a:txBody>
+                    <a:bodyPr/>
+                    <a:lstStyle/>
+                    <a:p>
+                      <a:r>
+                        <a:rPr lang="en-US" dirty="0"/>
+                        <a:t>2.66032190e+00</a:t>
+                      </a:r>
+                    </a:p>
+                  </a:txBody>
+                  <a:tcPr/>
+                </a:tc>
+                <a:tc>
+                  <a:txBody>
+                    <a:bodyPr/>
+                    <a:lstStyle/>
+                    <a:p>
+                      <a:r>
+                        <a:rPr lang="en-US" dirty="0"/>
+                        <a:t>1.80222374e-01</a:t>
+                      </a:r>
+                    </a:p>
+                  </a:txBody>
+                  <a:tcPr/>
+                </a:tc>
+                <a:tc>
+                  <a:txBody>
+                    <a:bodyPr/>
+                    <a:lstStyle/>
+                    <a:p>
+                      <a:r>
+                        <a:rPr lang="en-US" dirty="0"/>
+                        <a:t>1.32970280e+00</a:t>
                       </a:r>
                     </a:p>
                   </a:txBody>
@@ -6340,20 +6588,20 @@
                     <a:p>
                       <a:r>
                         <a:rPr lang="en-US" dirty="0"/>
-                        <a:t>5.52035461</a:t>
-                      </a:r>
-                    </a:p>
-                  </a:txBody>
-                  <a:tcPr/>
-                </a:tc>
-                <a:tc>
-                  <a:txBody>
-                    <a:bodyPr/>
-                    <a:lstStyle/>
-                    <a:p>
-                      <a:r>
-                        <a:rPr lang="en-US" dirty="0"/>
-                        <a:t>4.91266537</a:t>
+                        <a:t>2.85588940e+00</a:t>
+                      </a:r>
+                    </a:p>
+                  </a:txBody>
+                  <a:tcPr/>
+                </a:tc>
+                <a:tc>
+                  <a:txBody>
+                    <a:bodyPr/>
+                    <a:lstStyle/>
+                    <a:p>
+                      <a:r>
+                        <a:rPr lang="en-US" dirty="0"/>
+                        <a:t>3.15043807e+00</a:t>
                       </a:r>
                     </a:p>
                   </a:txBody>
@@ -6386,46 +6634,46 @@
                     <a:p>
                       <a:r>
                         <a:rPr lang="en-US" dirty="0"/>
-                        <a:t>0.65275521</a:t>
-                      </a:r>
-                    </a:p>
-                  </a:txBody>
-                  <a:tcPr/>
-                </a:tc>
-                <a:tc>
-                  <a:txBody>
-                    <a:bodyPr/>
-                    <a:lstStyle/>
-                    <a:p>
-                      <a:r>
-                        <a:rPr lang="en-US" dirty="0"/>
-                        <a:t>0.3955718</a:t>
-                      </a:r>
-                    </a:p>
-                  </a:txBody>
-                  <a:tcPr/>
-                </a:tc>
-                <a:tc>
-                  <a:txBody>
-                    <a:bodyPr/>
-                    <a:lstStyle/>
-                    <a:p>
-                      <a:r>
-                        <a:rPr lang="en-US" dirty="0"/>
-                        <a:t>0.65317188</a:t>
-                      </a:r>
-                    </a:p>
-                  </a:txBody>
-                  <a:tcPr/>
-                </a:tc>
-                <a:tc>
-                  <a:txBody>
-                    <a:bodyPr/>
-                    <a:lstStyle/>
-                    <a:p>
-                      <a:r>
-                        <a:rPr lang="en-US" dirty="0"/>
-                        <a:t>0.46533747</a:t>
+                        <a:t>1.02442460e-06</a:t>
+                      </a:r>
+                    </a:p>
+                  </a:txBody>
+                  <a:tcPr/>
+                </a:tc>
+                <a:tc>
+                  <a:txBody>
+                    <a:bodyPr/>
+                    <a:lstStyle/>
+                    <a:p>
+                      <a:r>
+                        <a:rPr lang="en-US" dirty="0"/>
+                        <a:t>1.72381963e-06</a:t>
+                      </a:r>
+                    </a:p>
+                  </a:txBody>
+                  <a:tcPr/>
+                </a:tc>
+                <a:tc>
+                  <a:txBody>
+                    <a:bodyPr/>
+                    <a:lstStyle/>
+                    <a:p>
+                      <a:r>
+                        <a:rPr lang="en-US" dirty="0"/>
+                        <a:t>5.25560399e-06</a:t>
+                      </a:r>
+                    </a:p>
+                  </a:txBody>
+                  <a:tcPr/>
+                </a:tc>
+                <a:tc>
+                  <a:txBody>
+                    <a:bodyPr/>
+                    <a:lstStyle/>
+                    <a:p>
+                      <a:r>
+                        <a:rPr lang="en-US" dirty="0"/>
+                        <a:t>2.26380537e-06</a:t>
                       </a:r>
                     </a:p>
                   </a:txBody>
@@ -6497,7 +6745,7 @@
                     <a:p>
                       <a:r>
                         <a:rPr lang="en-US" dirty="0"/>
-                        <a:t>0.27208794</a:t>
+                        <a:t>8.84391526e-06</a:t>
                       </a:r>
                     </a:p>
                   </a:txBody>
@@ -6719,14 +6967,14 @@
             <p:ph idx="1"/>
             <p:extLst>
               <p:ext uri="{D42A27DB-BD31-4B8C-83A1-F6EECF244321}">
-                <p14:modId xmlns:p14="http://schemas.microsoft.com/office/powerpoint/2010/main" val="3159587094"/>
+                <p14:modId xmlns:p14="http://schemas.microsoft.com/office/powerpoint/2010/main" val="3953433493"/>
               </p:ext>
             </p:extLst>
           </p:nvPr>
         </p:nvGraphicFramePr>
         <p:xfrm>
           <a:off x="828368" y="4397539"/>
-          <a:ext cx="10515600" cy="2225040"/>
+          <a:ext cx="10515600" cy="2595880"/>
         </p:xfrm>
         <a:graphic>
           <a:graphicData uri="http://schemas.openxmlformats.org/drawingml/2006/table">
@@ -6864,20 +7112,20 @@
                     <a:p>
                       <a:r>
                         <a:rPr lang="en-US" dirty="0"/>
-                        <a:t>-79.5072733364</a:t>
-                      </a:r>
-                    </a:p>
-                  </a:txBody>
-                  <a:tcPr/>
-                </a:tc>
-                <a:tc>
-                  <a:txBody>
-                    <a:bodyPr/>
-                    <a:lstStyle/>
-                    <a:p>
-                      <a:r>
-                        <a:rPr lang="en-US" dirty="0"/>
-                        <a:t>-78.4987541152</a:t>
+                        <a:t>-84.4280361667</a:t>
+                      </a:r>
+                    </a:p>
+                  </a:txBody>
+                  <a:tcPr/>
+                </a:tc>
+                <a:tc>
+                  <a:txBody>
+                    <a:bodyPr/>
+                    <a:lstStyle/>
+                    <a:p>
+                      <a:r>
+                        <a:rPr lang="en-US" dirty="0"/>
+                        <a:t>-84.4277430768</a:t>
                       </a:r>
                       <a:endParaRPr lang="en-US" dirty="0">
                         <a:highlight>
@@ -6899,7 +7147,7 @@
                             <a:schemeClr val="tx1"/>
                           </a:solidFill>
                         </a:rPr>
-                        <a:t>-72.4113238931</a:t>
+                        <a:t>-84.4281943301</a:t>
                       </a:r>
                       <a:endParaRPr lang="en-US" dirty="0">
                         <a:solidFill>
@@ -6927,7 +7175,7 @@
                           <a:ea typeface="+mn-ea"/>
                           <a:cs typeface="+mn-cs"/>
                         </a:rPr>
-                        <a:t>-71.7398615765</a:t>
+                        <a:t>-84.430912171</a:t>
                       </a:r>
                       <a:endParaRPr lang="en-US" dirty="0">
                         <a:solidFill>
@@ -6951,36 +7199,40 @@
                     <a:lstStyle/>
                     <a:p>
                       <a:r>
-                        <a:rPr lang="en-US" dirty="0" err="1"/>
-                        <a:t>Nu_a</a:t>
-                      </a:r>
-                      <a:endParaRPr lang="en-US" dirty="0"/>
-                    </a:p>
-                  </a:txBody>
-                  <a:tcPr/>
-                </a:tc>
-                <a:tc>
-                  <a:txBody>
-                    <a:bodyPr/>
-                    <a:lstStyle/>
-                    <a:p>
-                      <a:r>
-                        <a:rPr lang="en-US" dirty="0"/>
-                        <a:t>1.25970836</a:t>
-                      </a:r>
-                    </a:p>
-                  </a:txBody>
-                  <a:tcPr/>
-                </a:tc>
-                <a:tc>
-                  <a:txBody>
-                    <a:bodyPr/>
-                    <a:lstStyle/>
-                    <a:p>
-                      <a:r>
-                        <a:rPr lang="en-US" dirty="0"/>
-                        <a:t>1.27668903</a:t>
-                      </a:r>
+                        <a:rPr lang="en-US" dirty="0"/>
+                        <a:t>Theta</a:t>
+                      </a:r>
+                    </a:p>
+                  </a:txBody>
+                  <a:tcPr/>
+                </a:tc>
+                <a:tc>
+                  <a:txBody>
+                    <a:bodyPr/>
+                    <a:lstStyle/>
+                    <a:p>
+                      <a:r>
+                        <a:rPr lang="en-US" dirty="0"/>
+                        <a:t>2933.32017328</a:t>
+                      </a:r>
+                    </a:p>
+                  </a:txBody>
+                  <a:tcPr/>
+                </a:tc>
+                <a:tc>
+                  <a:txBody>
+                    <a:bodyPr/>
+                    <a:lstStyle/>
+                    <a:p>
+                      <a:r>
+                        <a:rPr lang="en-US" dirty="0"/>
+                        <a:t>2933.3160406</a:t>
+                      </a:r>
+                      <a:endParaRPr lang="en-US" dirty="0">
+                        <a:highlight>
+                          <a:srgbClr val="FFFF00"/>
+                        </a:highlight>
+                      </a:endParaRPr>
                     </a:p>
                   </a:txBody>
                   <a:tcPr/>
@@ -6996,7 +7248,96 @@
                             <a:schemeClr val="tx1"/>
                           </a:solidFill>
                         </a:rPr>
-                        <a:t>2.72055134</a:t>
+                        <a:t>2933.32239952</a:t>
+                      </a:r>
+                      <a:endParaRPr lang="en-US" dirty="0">
+                        <a:solidFill>
+                          <a:schemeClr val="tx1"/>
+                        </a:solidFill>
+                        <a:highlight>
+                          <a:srgbClr val="FFFF00"/>
+                        </a:highlight>
+                      </a:endParaRPr>
+                    </a:p>
+                  </a:txBody>
+                  <a:tcPr/>
+                </a:tc>
+                <a:tc>
+                  <a:txBody>
+                    <a:bodyPr/>
+                    <a:lstStyle/>
+                    <a:p>
+                      <a:r>
+                        <a:rPr lang="en-US" dirty="0">
+                          <a:solidFill>
+                            <a:schemeClr val="tx1"/>
+                          </a:solidFill>
+                        </a:rPr>
+                        <a:t>2933.36067766</a:t>
+                      </a:r>
+                    </a:p>
+                  </a:txBody>
+                  <a:tcPr/>
+                </a:tc>
+                <a:extLst>
+                  <a:ext uri="{0D108BD9-81ED-4DB2-BD59-A6C34878D82A}">
+                    <a16:rowId xmlns:a16="http://schemas.microsoft.com/office/drawing/2014/main" val="3918588214"/>
+                  </a:ext>
+                </a:extLst>
+              </a:tr>
+              <a:tr h="370840">
+                <a:tc>
+                  <a:txBody>
+                    <a:bodyPr/>
+                    <a:lstStyle/>
+                    <a:p>
+                      <a:r>
+                        <a:rPr lang="en-US" dirty="0" err="1"/>
+                        <a:t>Nu_a</a:t>
+                      </a:r>
+                      <a:endParaRPr lang="en-US" dirty="0"/>
+                    </a:p>
+                  </a:txBody>
+                  <a:tcPr/>
+                </a:tc>
+                <a:tc>
+                  <a:txBody>
+                    <a:bodyPr/>
+                    <a:lstStyle/>
+                    <a:p>
+                      <a:r>
+                        <a:rPr lang="en-US" dirty="0"/>
+                        <a:t>4.46379693e+00</a:t>
+                      </a:r>
+                    </a:p>
+                  </a:txBody>
+                  <a:tcPr/>
+                </a:tc>
+                <a:tc>
+                  <a:txBody>
+                    <a:bodyPr/>
+                    <a:lstStyle/>
+                    <a:p>
+                      <a:r>
+                        <a:rPr lang="en-US" dirty="0"/>
+                        <a:t>5.36526908e+00</a:t>
+                      </a:r>
+                    </a:p>
+                  </a:txBody>
+                  <a:tcPr/>
+                </a:tc>
+                <a:tc>
+                  <a:txBody>
+                    <a:bodyPr/>
+                    <a:lstStyle/>
+                    <a:p>
+                      <a:r>
+                        <a:rPr lang="en-US" dirty="0">
+                          <a:solidFill>
+                            <a:schemeClr val="tx1"/>
+                          </a:solidFill>
+                        </a:rPr>
+                        <a:t>1.05765374e-01</a:t>
                       </a:r>
                     </a:p>
                   </a:txBody>
@@ -7016,7 +7357,7 @@
                           <a:ea typeface="+mn-ea"/>
                           <a:cs typeface="+mn-cs"/>
                         </a:rPr>
-                        <a:t>2.87225645</a:t>
+                        <a:t>1.07461561e+00</a:t>
                       </a:r>
                       <a:endParaRPr lang="en-US" dirty="0">
                         <a:solidFill>
@@ -7085,7 +7426,7 @@
                             <a:schemeClr val="tx1"/>
                           </a:solidFill>
                         </a:rPr>
-                        <a:t>1.16513409</a:t>
+                        <a:t>2.22963596e+00</a:t>
                       </a:r>
                     </a:p>
                   </a:txBody>
@@ -7105,7 +7446,7 @@
                           <a:ea typeface="+mn-ea"/>
                           <a:cs typeface="+mn-cs"/>
                         </a:rPr>
-                        <a:t>1.22885559</a:t>
+                        <a:t>1.10774051e+00</a:t>
                       </a:r>
                       <a:endParaRPr lang="en-US" dirty="0">
                         <a:solidFill>
@@ -7143,20 +7484,20 @@
                     <a:p>
                       <a:r>
                         <a:rPr lang="en-US" dirty="0"/>
-                        <a:t>3.48244616</a:t>
-                      </a:r>
-                    </a:p>
-                  </a:txBody>
-                  <a:tcPr/>
-                </a:tc>
-                <a:tc>
-                  <a:txBody>
-                    <a:bodyPr/>
-                    <a:lstStyle/>
-                    <a:p>
-                      <a:r>
-                        <a:rPr lang="en-US" dirty="0"/>
-                        <a:t>1.50769258</a:t>
+                        <a:t>5.64333732e-06</a:t>
+                      </a:r>
+                    </a:p>
+                  </a:txBody>
+                  <a:tcPr/>
+                </a:tc>
+                <a:tc>
+                  <a:txBody>
+                    <a:bodyPr/>
+                    <a:lstStyle/>
+                    <a:p>
+                      <a:r>
+                        <a:rPr lang="en-US" dirty="0"/>
+                        <a:t>5.82328231e-06</a:t>
                       </a:r>
                     </a:p>
                   </a:txBody>
@@ -7173,7 +7514,7 @@
                             <a:schemeClr val="tx1"/>
                           </a:solidFill>
                         </a:rPr>
-                        <a:t>0.89676622</a:t>
+                        <a:t>7.67217488e-06</a:t>
                       </a:r>
                     </a:p>
                   </a:txBody>
@@ -7193,7 +7534,7 @@
                           <a:ea typeface="+mn-ea"/>
                           <a:cs typeface="+mn-cs"/>
                         </a:rPr>
-                        <a:t>0.49102279</a:t>
+                        <a:t>5.34393417e-06</a:t>
                       </a:r>
                       <a:endParaRPr lang="en-US" dirty="0">
                         <a:solidFill>
@@ -7281,7 +7622,7 @@
                           <a:ea typeface="+mn-ea"/>
                           <a:cs typeface="+mn-cs"/>
                         </a:rPr>
-                        <a:t>0.33065142</a:t>
+                        <a:t>6.05477793e-06</a:t>
                       </a:r>
                       <a:endParaRPr lang="en-US" dirty="0">
                         <a:solidFill>
@@ -7508,14 +7849,14 @@
             <p:ph idx="1"/>
             <p:extLst>
               <p:ext uri="{D42A27DB-BD31-4B8C-83A1-F6EECF244321}">
-                <p14:modId xmlns:p14="http://schemas.microsoft.com/office/powerpoint/2010/main" val="262392616"/>
+                <p14:modId xmlns:p14="http://schemas.microsoft.com/office/powerpoint/2010/main" val="4151597711"/>
               </p:ext>
             </p:extLst>
           </p:nvPr>
         </p:nvGraphicFramePr>
         <p:xfrm>
-          <a:off x="838200" y="4524522"/>
-          <a:ext cx="10515600" cy="2225040"/>
+          <a:off x="838200" y="4181971"/>
+          <a:ext cx="10515600" cy="2595880"/>
         </p:xfrm>
         <a:graphic>
           <a:graphicData uri="http://schemas.openxmlformats.org/drawingml/2006/table">
@@ -7653,33 +7994,33 @@
                     <a:p>
                       <a:r>
                         <a:rPr lang="en-US" dirty="0"/>
-                        <a:t>-147.46475957</a:t>
-                      </a:r>
-                    </a:p>
-                  </a:txBody>
-                  <a:tcPr/>
-                </a:tc>
-                <a:tc>
-                  <a:txBody>
-                    <a:bodyPr/>
-                    <a:lstStyle/>
-                    <a:p>
-                      <a:r>
-                        <a:rPr lang="en-US" dirty="0"/>
-                        <a:t>-145.123391468</a:t>
-                      </a:r>
-                    </a:p>
-                  </a:txBody>
-                  <a:tcPr/>
-                </a:tc>
-                <a:tc>
-                  <a:txBody>
-                    <a:bodyPr/>
-                    <a:lstStyle/>
-                    <a:p>
-                      <a:r>
-                        <a:rPr lang="en-US" dirty="0"/>
-                        <a:t>-142.935960178</a:t>
+                        <a:t>-897.498645722</a:t>
+                      </a:r>
+                    </a:p>
+                  </a:txBody>
+                  <a:tcPr/>
+                </a:tc>
+                <a:tc>
+                  <a:txBody>
+                    <a:bodyPr/>
+                    <a:lstStyle/>
+                    <a:p>
+                      <a:r>
+                        <a:rPr lang="en-US" dirty="0"/>
+                        <a:t>-897.491777242</a:t>
+                      </a:r>
+                    </a:p>
+                  </a:txBody>
+                  <a:tcPr/>
+                </a:tc>
+                <a:tc>
+                  <a:txBody>
+                    <a:bodyPr/>
+                    <a:lstStyle/>
+                    <a:p>
+                      <a:r>
+                        <a:rPr lang="en-US" dirty="0"/>
+                        <a:t>-897.407933484</a:t>
                       </a:r>
                       <a:endParaRPr lang="en-US" dirty="0">
                         <a:highlight>
@@ -7695,6 +8036,10 @@
                     <a:bodyPr/>
                     <a:lstStyle/>
                     <a:p>
+                      <a:r>
+                        <a:rPr lang="en-US" dirty="0"/>
+                        <a:t>-897.266410943</a:t>
+                      </a:r>
                       <a:endParaRPr lang="en-US" dirty="0">
                         <a:highlight>
                           <a:srgbClr val="FFFF00"/>
@@ -7717,6 +8062,88 @@
                     <a:lstStyle/>
                     <a:p>
                       <a:r>
+                        <a:rPr lang="en-US" dirty="0"/>
+                        <a:t>Theta</a:t>
+                      </a:r>
+                    </a:p>
+                  </a:txBody>
+                  <a:tcPr/>
+                </a:tc>
+                <a:tc>
+                  <a:txBody>
+                    <a:bodyPr/>
+                    <a:lstStyle/>
+                    <a:p>
+                      <a:r>
+                        <a:rPr lang="en-US" dirty="0"/>
+                        <a:t>4404.72068004</a:t>
+                      </a:r>
+                    </a:p>
+                  </a:txBody>
+                  <a:tcPr/>
+                </a:tc>
+                <a:tc>
+                  <a:txBody>
+                    <a:bodyPr/>
+                    <a:lstStyle/>
+                    <a:p>
+                      <a:r>
+                        <a:rPr lang="en-US" dirty="0"/>
+                        <a:t>4404.71771184</a:t>
+                      </a:r>
+                    </a:p>
+                  </a:txBody>
+                  <a:tcPr/>
+                </a:tc>
+                <a:tc>
+                  <a:txBody>
+                    <a:bodyPr/>
+                    <a:lstStyle/>
+                    <a:p>
+                      <a:r>
+                        <a:rPr lang="en-US" dirty="0"/>
+                        <a:t>4404.68147873</a:t>
+                      </a:r>
+                      <a:endParaRPr lang="en-US" dirty="0">
+                        <a:highlight>
+                          <a:srgbClr val="FFFF00"/>
+                        </a:highlight>
+                      </a:endParaRPr>
+                    </a:p>
+                  </a:txBody>
+                  <a:tcPr/>
+                </a:tc>
+                <a:tc>
+                  <a:txBody>
+                    <a:bodyPr/>
+                    <a:lstStyle/>
+                    <a:p>
+                      <a:r>
+                        <a:rPr lang="en-US" dirty="0"/>
+                        <a:t>9425.8874565</a:t>
+                      </a:r>
+                      <a:endParaRPr lang="en-US" dirty="0">
+                        <a:highlight>
+                          <a:srgbClr val="FFFF00"/>
+                        </a:highlight>
+                      </a:endParaRPr>
+                    </a:p>
+                  </a:txBody>
+                  <a:tcPr/>
+                </a:tc>
+                <a:extLst>
+                  <a:ext uri="{0D108BD9-81ED-4DB2-BD59-A6C34878D82A}">
+                    <a16:rowId xmlns:a16="http://schemas.microsoft.com/office/drawing/2014/main" val="2316122721"/>
+                  </a:ext>
+                </a:extLst>
+              </a:tr>
+              <a:tr h="370840">
+                <a:tc>
+                  <a:txBody>
+                    <a:bodyPr/>
+                    <a:lstStyle/>
+                    <a:p>
+                      <a:r>
                         <a:rPr lang="en-US" dirty="0" err="1"/>
                         <a:t>Nu_a</a:t>
                       </a:r>
@@ -7732,44 +8159,47 @@
                     <a:p>
                       <a:r>
                         <a:rPr lang="en-US" dirty="0"/>
-                        <a:t>5.13299045</a:t>
-                      </a:r>
-                    </a:p>
-                  </a:txBody>
-                  <a:tcPr/>
-                </a:tc>
-                <a:tc>
-                  <a:txBody>
-                    <a:bodyPr/>
-                    <a:lstStyle/>
-                    <a:p>
-                      <a:r>
-                        <a:rPr lang="en-US" dirty="0"/>
-                        <a:t>3.80385035</a:t>
-                      </a:r>
-                    </a:p>
-                  </a:txBody>
-                  <a:tcPr/>
-                </a:tc>
-                <a:tc>
-                  <a:txBody>
-                    <a:bodyPr/>
-                    <a:lstStyle/>
-                    <a:p>
-                      <a:r>
-                        <a:rPr lang="en-US" dirty="0"/>
-                        <a:t>0.46397566</a:t>
-                      </a:r>
-                    </a:p>
-                  </a:txBody>
-                  <a:tcPr/>
-                </a:tc>
-                <a:tc>
-                  <a:txBody>
-                    <a:bodyPr/>
-                    <a:lstStyle/>
-                    <a:p>
-                      <a:endParaRPr lang="en-US" dirty="0"/>
+                        <a:t>3.32105135e+00</a:t>
+                      </a:r>
+                    </a:p>
+                  </a:txBody>
+                  <a:tcPr/>
+                </a:tc>
+                <a:tc>
+                  <a:txBody>
+                    <a:bodyPr/>
+                    <a:lstStyle/>
+                    <a:p>
+                      <a:r>
+                        <a:rPr lang="en-US" dirty="0"/>
+                        <a:t>2.26374183e+00</a:t>
+                      </a:r>
+                    </a:p>
+                  </a:txBody>
+                  <a:tcPr/>
+                </a:tc>
+                <a:tc>
+                  <a:txBody>
+                    <a:bodyPr/>
+                    <a:lstStyle/>
+                    <a:p>
+                      <a:r>
+                        <a:rPr lang="en-US" dirty="0"/>
+                        <a:t>8.05076578e-02</a:t>
+                      </a:r>
+                    </a:p>
+                  </a:txBody>
+                  <a:tcPr/>
+                </a:tc>
+                <a:tc>
+                  <a:txBody>
+                    <a:bodyPr/>
+                    <a:lstStyle/>
+                    <a:p>
+                      <a:r>
+                        <a:rPr lang="en-US" dirty="0"/>
+                        <a:t>1.54383833e+00</a:t>
+                      </a:r>
                     </a:p>
                   </a:txBody>
                   <a:tcPr/>
@@ -7828,18 +8258,21 @@
                     <a:p>
                       <a:r>
                         <a:rPr lang="en-US" dirty="0"/>
-                        <a:t>4.41839408</a:t>
-                      </a:r>
-                    </a:p>
-                  </a:txBody>
-                  <a:tcPr/>
-                </a:tc>
-                <a:tc>
-                  <a:txBody>
-                    <a:bodyPr/>
-                    <a:lstStyle/>
-                    <a:p>
-                      <a:endParaRPr lang="en-US" dirty="0"/>
+                        <a:t>4.20940794e+00</a:t>
+                      </a:r>
+                    </a:p>
+                  </a:txBody>
+                  <a:tcPr/>
+                </a:tc>
+                <a:tc>
+                  <a:txBody>
+                    <a:bodyPr/>
+                    <a:lstStyle/>
+                    <a:p>
+                      <a:r>
+                        <a:rPr lang="en-US" dirty="0"/>
+                        <a:t>2.09339726e+00</a:t>
+                      </a:r>
                     </a:p>
                   </a:txBody>
                   <a:tcPr/>
@@ -7871,44 +8304,47 @@
                     <a:p>
                       <a:r>
                         <a:rPr lang="en-US" dirty="0"/>
-                        <a:t>0.09838097</a:t>
-                      </a:r>
-                    </a:p>
-                  </a:txBody>
-                  <a:tcPr/>
-                </a:tc>
-                <a:tc>
-                  <a:txBody>
-                    <a:bodyPr/>
-                    <a:lstStyle/>
-                    <a:p>
-                      <a:r>
-                        <a:rPr lang="en-US" dirty="0"/>
-                        <a:t>0.07048171</a:t>
-                      </a:r>
-                    </a:p>
-                  </a:txBody>
-                  <a:tcPr/>
-                </a:tc>
-                <a:tc>
-                  <a:txBody>
-                    <a:bodyPr/>
-                    <a:lstStyle/>
-                    <a:p>
-                      <a:r>
-                        <a:rPr lang="en-US" dirty="0"/>
-                        <a:t>0.17523284</a:t>
-                      </a:r>
-                    </a:p>
-                  </a:txBody>
-                  <a:tcPr/>
-                </a:tc>
-                <a:tc>
-                  <a:txBody>
-                    <a:bodyPr/>
-                    <a:lstStyle/>
-                    <a:p>
-                      <a:endParaRPr lang="en-US" dirty="0"/>
+                        <a:t>9.53897473e-07</a:t>
+                      </a:r>
+                    </a:p>
+                  </a:txBody>
+                  <a:tcPr/>
+                </a:tc>
+                <a:tc>
+                  <a:txBody>
+                    <a:bodyPr/>
+                    <a:lstStyle/>
+                    <a:p>
+                      <a:r>
+                        <a:rPr lang="en-US" dirty="0"/>
+                        <a:t>1.37011541e-06</a:t>
+                      </a:r>
+                    </a:p>
+                  </a:txBody>
+                  <a:tcPr/>
+                </a:tc>
+                <a:tc>
+                  <a:txBody>
+                    <a:bodyPr/>
+                    <a:lstStyle/>
+                    <a:p>
+                      <a:r>
+                        <a:rPr lang="en-US" dirty="0"/>
+                        <a:t>2.74200337e-06</a:t>
+                      </a:r>
+                    </a:p>
+                  </a:txBody>
+                  <a:tcPr/>
+                </a:tc>
+                <a:tc>
+                  <a:txBody>
+                    <a:bodyPr/>
+                    <a:lstStyle/>
+                    <a:p>
+                      <a:r>
+                        <a:rPr lang="en-US" dirty="0"/>
+                        <a:t>3.18891527e-06</a:t>
+                      </a:r>
                     </a:p>
                   </a:txBody>
                   <a:tcPr/>
@@ -7977,7 +8413,10 @@
                     <a:bodyPr/>
                     <a:lstStyle/>
                     <a:p>
-                      <a:endParaRPr lang="en-US" dirty="0"/>
+                      <a:r>
+                        <a:rPr lang="en-US" dirty="0"/>
+                        <a:t>6.13812088e-06</a:t>
+                      </a:r>
                     </a:p>
                   </a:txBody>
                   <a:tcPr/>
@@ -8108,7 +8547,7 @@
         <p:spPr>
           <a:xfrm>
             <a:off x="366866" y="1378089"/>
-            <a:ext cx="6962458" cy="2839950"/>
+            <a:ext cx="6277774" cy="2560671"/>
           </a:xfrm>
           <a:prstGeom prst="rect">
             <a:avLst/>
@@ -8286,14 +8725,14 @@
             <p:ph idx="1"/>
             <p:extLst>
               <p:ext uri="{D42A27DB-BD31-4B8C-83A1-F6EECF244321}">
-                <p14:modId xmlns:p14="http://schemas.microsoft.com/office/powerpoint/2010/main" val="4047319796"/>
+                <p14:modId xmlns:p14="http://schemas.microsoft.com/office/powerpoint/2010/main" val="336105510"/>
               </p:ext>
             </p:extLst>
           </p:nvPr>
         </p:nvGraphicFramePr>
         <p:xfrm>
-          <a:off x="838200" y="4539094"/>
-          <a:ext cx="10500487" cy="2225040"/>
+          <a:off x="838200" y="4180383"/>
+          <a:ext cx="10500487" cy="2595880"/>
         </p:xfrm>
         <a:graphic>
           <a:graphicData uri="http://schemas.openxmlformats.org/drawingml/2006/table">
@@ -8431,20 +8870,20 @@
                     <a:p>
                       <a:r>
                         <a:rPr lang="en-US" dirty="0"/>
-                        <a:t>-41.8555238016</a:t>
-                      </a:r>
-                    </a:p>
-                  </a:txBody>
-                  <a:tcPr/>
-                </a:tc>
-                <a:tc>
-                  <a:txBody>
-                    <a:bodyPr/>
-                    <a:lstStyle/>
-                    <a:p>
-                      <a:r>
-                        <a:rPr lang="en-US" dirty="0"/>
-                        <a:t>-36.8580257978</a:t>
+                        <a:t>-128.163159689</a:t>
+                      </a:r>
+                    </a:p>
+                  </a:txBody>
+                  <a:tcPr/>
+                </a:tc>
+                <a:tc>
+                  <a:txBody>
+                    <a:bodyPr/>
+                    <a:lstStyle/>
+                    <a:p>
+                      <a:r>
+                        <a:rPr lang="en-US" dirty="0"/>
+                        <a:t>-128.162733832</a:t>
                       </a:r>
                       <a:endParaRPr lang="en-US" dirty="0">
                         <a:highlight>
@@ -8462,7 +8901,7 @@
                     <a:p>
                       <a:r>
                         <a:rPr lang="en-US" dirty="0"/>
-                        <a:t>-32.4812368669</a:t>
+                        <a:t>-128.157934733</a:t>
                       </a:r>
                       <a:endParaRPr lang="en-US" dirty="0">
                         <a:highlight>
@@ -8480,7 +8919,7 @@
                     <a:p>
                       <a:r>
                         <a:rPr lang="en-US" dirty="0"/>
-                        <a:t>-25.7139166244</a:t>
+                        <a:t>-128.156369625</a:t>
                       </a:r>
                     </a:p>
                   </a:txBody>
@@ -8499,6 +8938,88 @@
                     <a:lstStyle/>
                     <a:p>
                       <a:r>
+                        <a:rPr lang="en-US" dirty="0"/>
+                        <a:t>Theta</a:t>
+                      </a:r>
+                    </a:p>
+                  </a:txBody>
+                  <a:tcPr/>
+                </a:tc>
+                <a:tc>
+                  <a:txBody>
+                    <a:bodyPr/>
+                    <a:lstStyle/>
+                    <a:p>
+                      <a:r>
+                        <a:rPr lang="en-US" dirty="0"/>
+                        <a:t>3906.10107241</a:t>
+                      </a:r>
+                    </a:p>
+                  </a:txBody>
+                  <a:tcPr/>
+                </a:tc>
+                <a:tc>
+                  <a:txBody>
+                    <a:bodyPr/>
+                    <a:lstStyle/>
+                    <a:p>
+                      <a:r>
+                        <a:rPr lang="en-US" dirty="0"/>
+                        <a:t>3906.09965379</a:t>
+                      </a:r>
+                      <a:endParaRPr lang="en-US" dirty="0">
+                        <a:highlight>
+                          <a:srgbClr val="FFFF00"/>
+                        </a:highlight>
+                      </a:endParaRPr>
+                    </a:p>
+                  </a:txBody>
+                  <a:tcPr/>
+                </a:tc>
+                <a:tc>
+                  <a:txBody>
+                    <a:bodyPr/>
+                    <a:lstStyle/>
+                    <a:p>
+                      <a:r>
+                        <a:rPr lang="en-US" dirty="0"/>
+                        <a:t>3906.08366661</a:t>
+                      </a:r>
+                      <a:endParaRPr lang="en-US" dirty="0">
+                        <a:highlight>
+                          <a:srgbClr val="FFFF00"/>
+                        </a:highlight>
+                      </a:endParaRPr>
+                    </a:p>
+                  </a:txBody>
+                  <a:tcPr/>
+                </a:tc>
+                <a:tc>
+                  <a:txBody>
+                    <a:bodyPr/>
+                    <a:lstStyle/>
+                    <a:p>
+                      <a:r>
+                        <a:rPr lang="en-US" dirty="0"/>
+                        <a:t>3906.07845237</a:t>
+                      </a:r>
+                    </a:p>
+                  </a:txBody>
+                  <a:tcPr/>
+                </a:tc>
+                <a:extLst>
+                  <a:ext uri="{0D108BD9-81ED-4DB2-BD59-A6C34878D82A}">
+                    <a16:rowId xmlns:a16="http://schemas.microsoft.com/office/drawing/2014/main" val="11877611"/>
+                  </a:ext>
+                </a:extLst>
+              </a:tr>
+              <a:tr h="370840">
+                <a:tc>
+                  <a:txBody>
+                    <a:bodyPr/>
+                    <a:lstStyle/>
+                    <a:p>
+                      <a:r>
                         <a:rPr lang="en-US" dirty="0" err="1"/>
                         <a:t>Nu_a</a:t>
                       </a:r>
@@ -8514,46 +9035,46 @@
                     <a:p>
                       <a:r>
                         <a:rPr lang="en-US" dirty="0"/>
-                        <a:t>3.54675343</a:t>
-                      </a:r>
-                    </a:p>
-                  </a:txBody>
-                  <a:tcPr/>
-                </a:tc>
-                <a:tc>
-                  <a:txBody>
-                    <a:bodyPr/>
-                    <a:lstStyle/>
-                    <a:p>
-                      <a:r>
-                        <a:rPr lang="en-US" dirty="0"/>
-                        <a:t>25.94229854</a:t>
-                      </a:r>
-                    </a:p>
-                  </a:txBody>
-                  <a:tcPr/>
-                </a:tc>
-                <a:tc>
-                  <a:txBody>
-                    <a:bodyPr/>
-                    <a:lstStyle/>
-                    <a:p>
-                      <a:r>
-                        <a:rPr lang="en-US" dirty="0"/>
-                        <a:t>5.72218052</a:t>
-                      </a:r>
-                    </a:p>
-                  </a:txBody>
-                  <a:tcPr/>
-                </a:tc>
-                <a:tc>
-                  <a:txBody>
-                    <a:bodyPr/>
-                    <a:lstStyle/>
-                    <a:p>
-                      <a:r>
-                        <a:rPr lang="en-US" dirty="0"/>
-                        <a:t>24.06635808</a:t>
+                        <a:t>4.27886621e+00</a:t>
+                      </a:r>
+                    </a:p>
+                  </a:txBody>
+                  <a:tcPr/>
+                </a:tc>
+                <a:tc>
+                  <a:txBody>
+                    <a:bodyPr/>
+                    <a:lstStyle/>
+                    <a:p>
+                      <a:r>
+                        <a:rPr lang="en-US" dirty="0"/>
+                        <a:t>3.39036114e+00</a:t>
+                      </a:r>
+                    </a:p>
+                  </a:txBody>
+                  <a:tcPr/>
+                </a:tc>
+                <a:tc>
+                  <a:txBody>
+                    <a:bodyPr/>
+                    <a:lstStyle/>
+                    <a:p>
+                      <a:r>
+                        <a:rPr lang="en-US" dirty="0"/>
+                        <a:t>1.70825988e-01</a:t>
+                      </a:r>
+                    </a:p>
+                  </a:txBody>
+                  <a:tcPr/>
+                </a:tc>
+                <a:tc>
+                  <a:txBody>
+                    <a:bodyPr/>
+                    <a:lstStyle/>
+                    <a:p>
+                      <a:r>
+                        <a:rPr lang="en-US" dirty="0"/>
+                        <a:t>1.65557183e+00</a:t>
                       </a:r>
                     </a:p>
                   </a:txBody>
@@ -8613,20 +9134,20 @@
                     <a:p>
                       <a:r>
                         <a:rPr lang="en-US" dirty="0"/>
-                        <a:t>1.95484218</a:t>
-                      </a:r>
-                    </a:p>
-                  </a:txBody>
-                  <a:tcPr/>
-                </a:tc>
-                <a:tc>
-                  <a:txBody>
-                    <a:bodyPr/>
-                    <a:lstStyle/>
-                    <a:p>
-                      <a:r>
-                        <a:rPr lang="en-US" dirty="0"/>
-                        <a:t>4.63164974</a:t>
+                        <a:t>3.38212536e+00</a:t>
+                      </a:r>
+                    </a:p>
+                  </a:txBody>
+                  <a:tcPr/>
+                </a:tc>
+                <a:tc>
+                  <a:txBody>
+                    <a:bodyPr/>
+                    <a:lstStyle/>
+                    <a:p>
+                      <a:r>
+                        <a:rPr lang="en-US" dirty="0"/>
+                        <a:t>1.87413557e+00</a:t>
                       </a:r>
                     </a:p>
                   </a:txBody>
@@ -8659,46 +9180,46 @@
                     <a:p>
                       <a:r>
                         <a:rPr lang="en-US" dirty="0"/>
-                        <a:t>4.63322821</a:t>
-                      </a:r>
-                    </a:p>
-                  </a:txBody>
-                  <a:tcPr/>
-                </a:tc>
-                <a:tc>
-                  <a:txBody>
-                    <a:bodyPr/>
-                    <a:lstStyle/>
-                    <a:p>
-                      <a:r>
-                        <a:rPr lang="en-US" dirty="0"/>
-                        <a:t>28.36962305</a:t>
-                      </a:r>
-                    </a:p>
-                  </a:txBody>
-                  <a:tcPr/>
-                </a:tc>
-                <a:tc>
-                  <a:txBody>
-                    <a:bodyPr/>
-                    <a:lstStyle/>
-                    <a:p>
-                      <a:r>
-                        <a:rPr lang="en-US" dirty="0"/>
-                        <a:t>1.15575146</a:t>
-                      </a:r>
-                    </a:p>
-                  </a:txBody>
-                  <a:tcPr/>
-                </a:tc>
-                <a:tc>
-                  <a:txBody>
-                    <a:bodyPr/>
-                    <a:lstStyle/>
-                    <a:p>
-                      <a:r>
-                        <a:rPr lang="en-US" dirty="0"/>
-                        <a:t>4.14974652</a:t>
+                        <a:t>3.15374995e-06</a:t>
+                      </a:r>
+                    </a:p>
+                  </a:txBody>
+                  <a:tcPr/>
+                </a:tc>
+                <a:tc>
+                  <a:txBody>
+                    <a:bodyPr/>
+                    <a:lstStyle/>
+                    <a:p>
+                      <a:r>
+                        <a:rPr lang="en-US" dirty="0"/>
+                        <a:t>3.72256834e-06</a:t>
+                      </a:r>
+                    </a:p>
+                  </a:txBody>
+                  <a:tcPr/>
+                </a:tc>
+                <a:tc>
+                  <a:txBody>
+                    <a:bodyPr/>
+                    <a:lstStyle/>
+                    <a:p>
+                      <a:r>
+                        <a:rPr lang="en-US" dirty="0"/>
+                        <a:t>7.29367339e-06</a:t>
+                      </a:r>
+                    </a:p>
+                  </a:txBody>
+                  <a:tcPr/>
+                </a:tc>
+                <a:tc>
+                  <a:txBody>
+                    <a:bodyPr/>
+                    <a:lstStyle/>
+                    <a:p>
+                      <a:r>
+                        <a:rPr lang="en-US" dirty="0"/>
+                        <a:t>6.28519567e-06</a:t>
                       </a:r>
                     </a:p>
                   </a:txBody>
@@ -8770,7 +9291,7 @@
                     <a:p>
                       <a:r>
                         <a:rPr lang="en-US" dirty="0"/>
-                        <a:t>1.32298356</a:t>
+                        <a:t>7.74858409e-06</a:t>
                       </a:r>
                     </a:p>
                   </a:txBody>
@@ -8808,8 +9329,8 @@
         </p:blipFill>
         <p:spPr>
           <a:xfrm>
-            <a:off x="135654" y="1379677"/>
-            <a:ext cx="6782757" cy="2810182"/>
+            <a:off x="135655" y="1379677"/>
+            <a:ext cx="6432786" cy="2665185"/>
           </a:xfrm>
           <a:prstGeom prst="rect">
             <a:avLst/>
@@ -8851,6 +9372,790 @@
           <p:cNvPr id="2" name="Title 1">
             <a:extLst>
               <a:ext uri="{FF2B5EF4-FFF2-40B4-BE49-F238E27FC236}">
+                <a16:creationId xmlns:a16="http://schemas.microsoft.com/office/drawing/2014/main" id="{FC0C9624-1DBB-4B7A-B446-0EC6DD7756EB}"/>
+              </a:ext>
+            </a:extLst>
+          </p:cNvPr>
+          <p:cNvSpPr>
+            <a:spLocks noGrp="1"/>
+          </p:cNvSpPr>
+          <p:nvPr>
+            <p:ph type="title"/>
+          </p:nvPr>
+        </p:nvSpPr>
+        <p:spPr/>
+        <p:txBody>
+          <a:bodyPr/>
+          <a:lstStyle/>
+          <a:p>
+            <a:r>
+              <a:rPr lang="en-US" dirty="0"/>
+              <a:t>Bacteroides </a:t>
+            </a:r>
+            <a:r>
+              <a:rPr lang="en-US" dirty="0" err="1"/>
+              <a:t>massiliensis</a:t>
+            </a:r>
+            <a:endParaRPr lang="en-US" dirty="0"/>
+          </a:p>
+        </p:txBody>
+      </p:sp>
+      <p:sp>
+        <p:nvSpPr>
+          <p:cNvPr id="6" name="TextBox 5">
+            <a:extLst>
+              <a:ext uri="{FF2B5EF4-FFF2-40B4-BE49-F238E27FC236}">
+                <a16:creationId xmlns:a16="http://schemas.microsoft.com/office/drawing/2014/main" id="{800B2470-8A14-490B-8A6D-A41088728B65}"/>
+              </a:ext>
+            </a:extLst>
+          </p:cNvPr>
+          <p:cNvSpPr txBox="1"/>
+          <p:nvPr/>
+        </p:nvSpPr>
+        <p:spPr>
+          <a:xfrm>
+            <a:off x="7096453" y="1690688"/>
+            <a:ext cx="5095547" cy="1754326"/>
+          </a:xfrm>
+          <a:prstGeom prst="rect">
+            <a:avLst/>
+          </a:prstGeom>
+          <a:noFill/>
+        </p:spPr>
+        <p:txBody>
+          <a:bodyPr wrap="square" rtlCol="0">
+            <a:spAutoFit/>
+          </a:bodyPr>
+          <a:lstStyle/>
+          <a:p>
+            <a:pPr marL="285750" indent="-285750">
+              <a:buFont typeface="Arial" panose="020B0604020202020204" pitchFamily="34" charset="0"/>
+              <a:buChar char="•"/>
+            </a:pPr>
+            <a:r>
+              <a:rPr lang="en-US" dirty="0" err="1"/>
+              <a:t>Nu_a</a:t>
+            </a:r>
+            <a:r>
+              <a:rPr lang="en-US" dirty="0"/>
+              <a:t>: contemporary population relative to ancestral population before first epoch</a:t>
+            </a:r>
+          </a:p>
+          <a:p>
+            <a:pPr marL="285750" indent="-285750">
+              <a:buFont typeface="Arial" panose="020B0604020202020204" pitchFamily="34" charset="0"/>
+              <a:buChar char="•"/>
+            </a:pPr>
+            <a:r>
+              <a:rPr lang="en-US" dirty="0" err="1"/>
+              <a:t>Nu_b</a:t>
+            </a:r>
+            <a:r>
+              <a:rPr lang="en-US" dirty="0"/>
+              <a:t>: contemporary population relative to ancestral population before second epoch</a:t>
+            </a:r>
+          </a:p>
+          <a:p>
+            <a:pPr marL="285750" indent="-285750">
+              <a:buFont typeface="Arial" panose="020B0604020202020204" pitchFamily="34" charset="0"/>
+              <a:buChar char="•"/>
+            </a:pPr>
+            <a:r>
+              <a:rPr lang="en-US" dirty="0"/>
+              <a:t>T_1: Duration of first epoch (units of 2 * </a:t>
+            </a:r>
+            <a:r>
+              <a:rPr lang="en-US" dirty="0" err="1"/>
+              <a:t>N_a</a:t>
+            </a:r>
+            <a:r>
+              <a:rPr lang="en-US" dirty="0"/>
+              <a:t>)</a:t>
+            </a:r>
+          </a:p>
+          <a:p>
+            <a:pPr marL="285750" indent="-285750">
+              <a:buFont typeface="Arial" panose="020B0604020202020204" pitchFamily="34" charset="0"/>
+              <a:buChar char="•"/>
+            </a:pPr>
+            <a:r>
+              <a:rPr lang="en-US" dirty="0"/>
+              <a:t>T_2: Duration of second epoch (units of 2 * </a:t>
+            </a:r>
+            <a:r>
+              <a:rPr lang="en-US" dirty="0" err="1"/>
+              <a:t>N_a</a:t>
+            </a:r>
+            <a:r>
+              <a:rPr lang="en-US" dirty="0"/>
+              <a:t>)</a:t>
+            </a:r>
+          </a:p>
+        </p:txBody>
+      </p:sp>
+      <p:graphicFrame>
+        <p:nvGraphicFramePr>
+          <p:cNvPr id="7" name="Table 4">
+            <a:extLst>
+              <a:ext uri="{FF2B5EF4-FFF2-40B4-BE49-F238E27FC236}">
+                <a16:creationId xmlns:a16="http://schemas.microsoft.com/office/drawing/2014/main" id="{06D0BF44-F2DB-436F-AFA0-8D66714183F7}"/>
+              </a:ext>
+            </a:extLst>
+          </p:cNvPr>
+          <p:cNvGraphicFramePr>
+            <a:graphicFrameLocks noGrp="1"/>
+          </p:cNvGraphicFramePr>
+          <p:nvPr>
+            <p:ph idx="1"/>
+            <p:extLst>
+              <p:ext uri="{D42A27DB-BD31-4B8C-83A1-F6EECF244321}">
+                <p14:modId xmlns:p14="http://schemas.microsoft.com/office/powerpoint/2010/main" val="1883324444"/>
+              </p:ext>
+            </p:extLst>
+          </p:nvPr>
+        </p:nvGraphicFramePr>
+        <p:xfrm>
+          <a:off x="838200" y="4180383"/>
+          <a:ext cx="10500487" cy="2595880"/>
+        </p:xfrm>
+        <a:graphic>
+          <a:graphicData uri="http://schemas.openxmlformats.org/drawingml/2006/table">
+            <a:tbl>
+              <a:tblPr firstRow="1" bandRow="1">
+                <a:tableStyleId>{073A0DAA-6AF3-43AB-8588-CEC1D06C72B9}</a:tableStyleId>
+              </a:tblPr>
+              <a:tblGrid>
+                <a:gridCol w="2103120">
+                  <a:extLst>
+                    <a:ext uri="{9D8B030D-6E8A-4147-A177-3AD203B41FA5}">
+                      <a16:colId xmlns:a16="http://schemas.microsoft.com/office/drawing/2014/main" val="2900726404"/>
+                    </a:ext>
+                  </a:extLst>
+                </a:gridCol>
+                <a:gridCol w="2088007">
+                  <a:extLst>
+                    <a:ext uri="{9D8B030D-6E8A-4147-A177-3AD203B41FA5}">
+                      <a16:colId xmlns:a16="http://schemas.microsoft.com/office/drawing/2014/main" val="2297780930"/>
+                    </a:ext>
+                  </a:extLst>
+                </a:gridCol>
+                <a:gridCol w="2103120">
+                  <a:extLst>
+                    <a:ext uri="{9D8B030D-6E8A-4147-A177-3AD203B41FA5}">
+                      <a16:colId xmlns:a16="http://schemas.microsoft.com/office/drawing/2014/main" val="1352057416"/>
+                    </a:ext>
+                  </a:extLst>
+                </a:gridCol>
+                <a:gridCol w="2103120">
+                  <a:extLst>
+                    <a:ext uri="{9D8B030D-6E8A-4147-A177-3AD203B41FA5}">
+                      <a16:colId xmlns:a16="http://schemas.microsoft.com/office/drawing/2014/main" val="1457082074"/>
+                    </a:ext>
+                  </a:extLst>
+                </a:gridCol>
+                <a:gridCol w="2103120">
+                  <a:extLst>
+                    <a:ext uri="{9D8B030D-6E8A-4147-A177-3AD203B41FA5}">
+                      <a16:colId xmlns:a16="http://schemas.microsoft.com/office/drawing/2014/main" val="633438695"/>
+                    </a:ext>
+                  </a:extLst>
+                </a:gridCol>
+              </a:tblGrid>
+              <a:tr h="370840">
+                <a:tc>
+                  <a:txBody>
+                    <a:bodyPr/>
+                    <a:lstStyle/>
+                    <a:p>
+                      <a:r>
+                        <a:rPr lang="en-US" dirty="0"/>
+                        <a:t>Model</a:t>
+                      </a:r>
+                    </a:p>
+                  </a:txBody>
+                  <a:tcPr/>
+                </a:tc>
+                <a:tc>
+                  <a:txBody>
+                    <a:bodyPr/>
+                    <a:lstStyle/>
+                    <a:p>
+                      <a:r>
+                        <a:rPr lang="en-US" dirty="0"/>
+                        <a:t>Exponential growth</a:t>
+                      </a:r>
+                    </a:p>
+                  </a:txBody>
+                  <a:tcPr/>
+                </a:tc>
+                <a:tc>
+                  <a:txBody>
+                    <a:bodyPr/>
+                    <a:lstStyle/>
+                    <a:p>
+                      <a:r>
+                        <a:rPr lang="en-US" dirty="0"/>
+                        <a:t>Two-epoch</a:t>
+                      </a:r>
+                    </a:p>
+                  </a:txBody>
+                  <a:tcPr/>
+                </a:tc>
+                <a:tc>
+                  <a:txBody>
+                    <a:bodyPr/>
+                    <a:lstStyle/>
+                    <a:p>
+                      <a:r>
+                        <a:rPr lang="en-US" dirty="0"/>
+                        <a:t>Bottleneck + growth</a:t>
+                      </a:r>
+                    </a:p>
+                  </a:txBody>
+                  <a:tcPr/>
+                </a:tc>
+                <a:tc>
+                  <a:txBody>
+                    <a:bodyPr/>
+                    <a:lstStyle/>
+                    <a:p>
+                      <a:r>
+                        <a:rPr lang="en-US" dirty="0"/>
+                        <a:t>Three-epoch</a:t>
+                      </a:r>
+                    </a:p>
+                  </a:txBody>
+                  <a:tcPr/>
+                </a:tc>
+                <a:extLst>
+                  <a:ext uri="{0D108BD9-81ED-4DB2-BD59-A6C34878D82A}">
+                    <a16:rowId xmlns:a16="http://schemas.microsoft.com/office/drawing/2014/main" val="3143057051"/>
+                  </a:ext>
+                </a:extLst>
+              </a:tr>
+              <a:tr h="370840">
+                <a:tc>
+                  <a:txBody>
+                    <a:bodyPr/>
+                    <a:lstStyle/>
+                    <a:p>
+                      <a:r>
+                        <a:rPr lang="en-US" dirty="0"/>
+                        <a:t>Log Likelihood</a:t>
+                      </a:r>
+                    </a:p>
+                  </a:txBody>
+                  <a:tcPr/>
+                </a:tc>
+                <a:tc>
+                  <a:txBody>
+                    <a:bodyPr/>
+                    <a:lstStyle/>
+                    <a:p>
+                      <a:r>
+                        <a:rPr lang="en-US" dirty="0"/>
+                        <a:t>-198.754592695</a:t>
+                      </a:r>
+                    </a:p>
+                  </a:txBody>
+                  <a:tcPr/>
+                </a:tc>
+                <a:tc>
+                  <a:txBody>
+                    <a:bodyPr/>
+                    <a:lstStyle/>
+                    <a:p>
+                      <a:r>
+                        <a:rPr lang="en-US" dirty="0"/>
+                        <a:t>-198.754329559</a:t>
+                      </a:r>
+                      <a:endParaRPr lang="en-US" dirty="0">
+                        <a:highlight>
+                          <a:srgbClr val="FFFF00"/>
+                        </a:highlight>
+                      </a:endParaRPr>
+                    </a:p>
+                  </a:txBody>
+                  <a:tcPr/>
+                </a:tc>
+                <a:tc>
+                  <a:txBody>
+                    <a:bodyPr/>
+                    <a:lstStyle/>
+                    <a:p>
+                      <a:r>
+                        <a:rPr lang="en-US" dirty="0"/>
+                        <a:t>-198.749679615</a:t>
+                      </a:r>
+                      <a:endParaRPr lang="en-US" dirty="0">
+                        <a:highlight>
+                          <a:srgbClr val="FFFF00"/>
+                        </a:highlight>
+                      </a:endParaRPr>
+                    </a:p>
+                  </a:txBody>
+                  <a:tcPr/>
+                </a:tc>
+                <a:tc>
+                  <a:txBody>
+                    <a:bodyPr/>
+                    <a:lstStyle/>
+                    <a:p>
+                      <a:r>
+                        <a:rPr lang="en-US" dirty="0"/>
+                        <a:t>-198.756543857</a:t>
+                      </a:r>
+                    </a:p>
+                  </a:txBody>
+                  <a:tcPr/>
+                </a:tc>
+                <a:extLst>
+                  <a:ext uri="{0D108BD9-81ED-4DB2-BD59-A6C34878D82A}">
+                    <a16:rowId xmlns:a16="http://schemas.microsoft.com/office/drawing/2014/main" val="3235037204"/>
+                  </a:ext>
+                </a:extLst>
+              </a:tr>
+              <a:tr h="370840">
+                <a:tc>
+                  <a:txBody>
+                    <a:bodyPr/>
+                    <a:lstStyle/>
+                    <a:p>
+                      <a:r>
+                        <a:rPr lang="en-US" dirty="0"/>
+                        <a:t>Theta</a:t>
+                      </a:r>
+                    </a:p>
+                  </a:txBody>
+                  <a:tcPr/>
+                </a:tc>
+                <a:tc>
+                  <a:txBody>
+                    <a:bodyPr/>
+                    <a:lstStyle/>
+                    <a:p>
+                      <a:r>
+                        <a:rPr lang="en-US" dirty="0"/>
+                        <a:t>339.777255355</a:t>
+                      </a:r>
+                    </a:p>
+                  </a:txBody>
+                  <a:tcPr/>
+                </a:tc>
+                <a:tc>
+                  <a:txBody>
+                    <a:bodyPr/>
+                    <a:lstStyle/>
+                    <a:p>
+                      <a:r>
+                        <a:rPr lang="en-US" dirty="0"/>
+                        <a:t>339.777110828</a:t>
+                      </a:r>
+                      <a:endParaRPr lang="en-US" dirty="0">
+                        <a:highlight>
+                          <a:srgbClr val="FFFF00"/>
+                        </a:highlight>
+                      </a:endParaRPr>
+                    </a:p>
+                  </a:txBody>
+                  <a:tcPr/>
+                </a:tc>
+                <a:tc>
+                  <a:txBody>
+                    <a:bodyPr/>
+                    <a:lstStyle/>
+                    <a:p>
+                      <a:r>
+                        <a:rPr lang="en-US" dirty="0"/>
+                        <a:t>339.774556808</a:t>
+                      </a:r>
+                      <a:endParaRPr lang="en-US" dirty="0">
+                        <a:highlight>
+                          <a:srgbClr val="FFFF00"/>
+                        </a:highlight>
+                      </a:endParaRPr>
+                    </a:p>
+                  </a:txBody>
+                  <a:tcPr/>
+                </a:tc>
+                <a:tc>
+                  <a:txBody>
+                    <a:bodyPr/>
+                    <a:lstStyle/>
+                    <a:p>
+                      <a:r>
+                        <a:rPr lang="en-US" dirty="0"/>
+                        <a:t>339.778326981</a:t>
+                      </a:r>
+                    </a:p>
+                  </a:txBody>
+                  <a:tcPr/>
+                </a:tc>
+                <a:extLst>
+                  <a:ext uri="{0D108BD9-81ED-4DB2-BD59-A6C34878D82A}">
+                    <a16:rowId xmlns:a16="http://schemas.microsoft.com/office/drawing/2014/main" val="11877611"/>
+                  </a:ext>
+                </a:extLst>
+              </a:tr>
+              <a:tr h="370840">
+                <a:tc>
+                  <a:txBody>
+                    <a:bodyPr/>
+                    <a:lstStyle/>
+                    <a:p>
+                      <a:r>
+                        <a:rPr lang="en-US" dirty="0" err="1"/>
+                        <a:t>Nu_a</a:t>
+                      </a:r>
+                      <a:endParaRPr lang="en-US" dirty="0"/>
+                    </a:p>
+                  </a:txBody>
+                  <a:tcPr/>
+                </a:tc>
+                <a:tc>
+                  <a:txBody>
+                    <a:bodyPr/>
+                    <a:lstStyle/>
+                    <a:p>
+                      <a:r>
+                        <a:rPr lang="en-US" dirty="0"/>
+                        <a:t>4.32759476e+00</a:t>
+                      </a:r>
+                    </a:p>
+                  </a:txBody>
+                  <a:tcPr/>
+                </a:tc>
+                <a:tc>
+                  <a:txBody>
+                    <a:bodyPr/>
+                    <a:lstStyle/>
+                    <a:p>
+                      <a:r>
+                        <a:rPr lang="en-US" dirty="0"/>
+                        <a:t>4.43082804e+00</a:t>
+                      </a:r>
+                    </a:p>
+                  </a:txBody>
+                  <a:tcPr/>
+                </a:tc>
+                <a:tc>
+                  <a:txBody>
+                    <a:bodyPr/>
+                    <a:lstStyle/>
+                    <a:p>
+                      <a:r>
+                        <a:rPr lang="en-US" dirty="0"/>
+                        <a:t>7.81905393e-02</a:t>
+                      </a:r>
+                    </a:p>
+                  </a:txBody>
+                  <a:tcPr/>
+                </a:tc>
+                <a:tc>
+                  <a:txBody>
+                    <a:bodyPr/>
+                    <a:lstStyle/>
+                    <a:p>
+                      <a:r>
+                        <a:rPr lang="en-US" dirty="0"/>
+                        <a:t>1.16476667e+00</a:t>
+                      </a:r>
+                    </a:p>
+                  </a:txBody>
+                  <a:tcPr/>
+                </a:tc>
+                <a:extLst>
+                  <a:ext uri="{0D108BD9-81ED-4DB2-BD59-A6C34878D82A}">
+                    <a16:rowId xmlns:a16="http://schemas.microsoft.com/office/drawing/2014/main" val="2717148640"/>
+                  </a:ext>
+                </a:extLst>
+              </a:tr>
+              <a:tr h="370840">
+                <a:tc>
+                  <a:txBody>
+                    <a:bodyPr/>
+                    <a:lstStyle/>
+                    <a:p>
+                      <a:r>
+                        <a:rPr lang="en-US" dirty="0" err="1"/>
+                        <a:t>Nu_b</a:t>
+                      </a:r>
+                      <a:endParaRPr lang="en-US" dirty="0"/>
+                    </a:p>
+                  </a:txBody>
+                  <a:tcPr/>
+                </a:tc>
+                <a:tc>
+                  <a:txBody>
+                    <a:bodyPr/>
+                    <a:lstStyle/>
+                    <a:p>
+                      <a:r>
+                        <a:rPr lang="en-US" dirty="0"/>
+                        <a:t>N/A</a:t>
+                      </a:r>
+                    </a:p>
+                  </a:txBody>
+                  <a:tcPr/>
+                </a:tc>
+                <a:tc>
+                  <a:txBody>
+                    <a:bodyPr/>
+                    <a:lstStyle/>
+                    <a:p>
+                      <a:r>
+                        <a:rPr lang="en-US" dirty="0"/>
+                        <a:t>N/A</a:t>
+                      </a:r>
+                    </a:p>
+                  </a:txBody>
+                  <a:tcPr/>
+                </a:tc>
+                <a:tc>
+                  <a:txBody>
+                    <a:bodyPr/>
+                    <a:lstStyle/>
+                    <a:p>
+                      <a:r>
+                        <a:rPr lang="en-US" dirty="0"/>
+                        <a:t>4.26742967e+00</a:t>
+                      </a:r>
+                    </a:p>
+                  </a:txBody>
+                  <a:tcPr/>
+                </a:tc>
+                <a:tc>
+                  <a:txBody>
+                    <a:bodyPr/>
+                    <a:lstStyle/>
+                    <a:p>
+                      <a:r>
+                        <a:rPr lang="en-US" dirty="0"/>
+                        <a:t>1.35510600e+00</a:t>
+                      </a:r>
+                    </a:p>
+                  </a:txBody>
+                  <a:tcPr/>
+                </a:tc>
+                <a:extLst>
+                  <a:ext uri="{0D108BD9-81ED-4DB2-BD59-A6C34878D82A}">
+                    <a16:rowId xmlns:a16="http://schemas.microsoft.com/office/drawing/2014/main" val="3992781458"/>
+                  </a:ext>
+                </a:extLst>
+              </a:tr>
+              <a:tr h="370840">
+                <a:tc>
+                  <a:txBody>
+                    <a:bodyPr/>
+                    <a:lstStyle/>
+                    <a:p>
+                      <a:r>
+                        <a:rPr lang="en-US" dirty="0"/>
+                        <a:t>T_12</a:t>
+                      </a:r>
+                    </a:p>
+                  </a:txBody>
+                  <a:tcPr/>
+                </a:tc>
+                <a:tc>
+                  <a:txBody>
+                    <a:bodyPr/>
+                    <a:lstStyle/>
+                    <a:p>
+                      <a:r>
+                        <a:rPr lang="en-US" dirty="0"/>
+                        <a:t>5.66811422e-06</a:t>
+                      </a:r>
+                    </a:p>
+                  </a:txBody>
+                  <a:tcPr/>
+                </a:tc>
+                <a:tc>
+                  <a:txBody>
+                    <a:bodyPr/>
+                    <a:lstStyle/>
+                    <a:p>
+                      <a:r>
+                        <a:rPr lang="en-US" dirty="0"/>
+                        <a:t>5.96464548e-06</a:t>
+                      </a:r>
+                    </a:p>
+                  </a:txBody>
+                  <a:tcPr/>
+                </a:tc>
+                <a:tc>
+                  <a:txBody>
+                    <a:bodyPr/>
+                    <a:lstStyle/>
+                    <a:p>
+                      <a:r>
+                        <a:rPr lang="en-US" dirty="0"/>
+                        <a:t>1.21224728e-05</a:t>
+                      </a:r>
+                    </a:p>
+                  </a:txBody>
+                  <a:tcPr/>
+                </a:tc>
+                <a:tc>
+                  <a:txBody>
+                    <a:bodyPr/>
+                    <a:lstStyle/>
+                    <a:p>
+                      <a:r>
+                        <a:rPr lang="en-US" dirty="0"/>
+                        <a:t>4.40423001e-06</a:t>
+                      </a:r>
+                    </a:p>
+                  </a:txBody>
+                  <a:tcPr/>
+                </a:tc>
+                <a:extLst>
+                  <a:ext uri="{0D108BD9-81ED-4DB2-BD59-A6C34878D82A}">
+                    <a16:rowId xmlns:a16="http://schemas.microsoft.com/office/drawing/2014/main" val="3283572519"/>
+                  </a:ext>
+                </a:extLst>
+              </a:tr>
+              <a:tr h="370840">
+                <a:tc>
+                  <a:txBody>
+                    <a:bodyPr/>
+                    <a:lstStyle/>
+                    <a:p>
+                      <a:r>
+                        <a:rPr lang="en-US" dirty="0"/>
+                        <a:t>T_23</a:t>
+                      </a:r>
+                    </a:p>
+                  </a:txBody>
+                  <a:tcPr/>
+                </a:tc>
+                <a:tc>
+                  <a:txBody>
+                    <a:bodyPr/>
+                    <a:lstStyle/>
+                    <a:p>
+                      <a:r>
+                        <a:rPr lang="en-US" dirty="0"/>
+                        <a:t>N/A</a:t>
+                      </a:r>
+                    </a:p>
+                  </a:txBody>
+                  <a:tcPr/>
+                </a:tc>
+                <a:tc>
+                  <a:txBody>
+                    <a:bodyPr/>
+                    <a:lstStyle/>
+                    <a:p>
+                      <a:r>
+                        <a:rPr lang="en-US" dirty="0"/>
+                        <a:t>N/A</a:t>
+                      </a:r>
+                    </a:p>
+                  </a:txBody>
+                  <a:tcPr/>
+                </a:tc>
+                <a:tc>
+                  <a:txBody>
+                    <a:bodyPr/>
+                    <a:lstStyle/>
+                    <a:p>
+                      <a:r>
+                        <a:rPr lang="en-US" dirty="0"/>
+                        <a:t>N/A</a:t>
+                      </a:r>
+                    </a:p>
+                  </a:txBody>
+                  <a:tcPr/>
+                </a:tc>
+                <a:tc>
+                  <a:txBody>
+                    <a:bodyPr/>
+                    <a:lstStyle/>
+                    <a:p>
+                      <a:r>
+                        <a:rPr lang="en-US" dirty="0"/>
+                        <a:t>7.13473226e-06</a:t>
+                      </a:r>
+                    </a:p>
+                  </a:txBody>
+                  <a:tcPr/>
+                </a:tc>
+                <a:extLst>
+                  <a:ext uri="{0D108BD9-81ED-4DB2-BD59-A6C34878D82A}">
+                    <a16:rowId xmlns:a16="http://schemas.microsoft.com/office/drawing/2014/main" val="2422470866"/>
+                  </a:ext>
+                </a:extLst>
+              </a:tr>
+            </a:tbl>
+          </a:graphicData>
+        </a:graphic>
+      </p:graphicFrame>
+      <p:pic>
+        <p:nvPicPr>
+          <p:cNvPr id="4" name="Picture 3">
+            <a:extLst>
+              <a:ext uri="{FF2B5EF4-FFF2-40B4-BE49-F238E27FC236}">
+                <a16:creationId xmlns:a16="http://schemas.microsoft.com/office/drawing/2014/main" id="{CD140DE1-8DB9-4C6A-82C9-15C21C67963A}"/>
+              </a:ext>
+            </a:extLst>
+          </p:cNvPr>
+          <p:cNvPicPr>
+            <a:picLocks noChangeAspect="1"/>
+          </p:cNvPicPr>
+          <p:nvPr/>
+        </p:nvPicPr>
+        <p:blipFill>
+          <a:blip r:embed="rId2"/>
+          <a:stretch>
+            <a:fillRect/>
+          </a:stretch>
+        </p:blipFill>
+        <p:spPr>
+          <a:xfrm>
+            <a:off x="1844712" y="1494813"/>
+            <a:ext cx="4251288" cy="2685570"/>
+          </a:xfrm>
+          <a:prstGeom prst="rect">
+            <a:avLst/>
+          </a:prstGeom>
+        </p:spPr>
+      </p:pic>
+    </p:spTree>
+    <p:extLst>
+      <p:ext uri="{BB962C8B-B14F-4D97-AF65-F5344CB8AC3E}">
+        <p14:creationId xmlns:p14="http://schemas.microsoft.com/office/powerpoint/2010/main" val="3314603118"/>
+      </p:ext>
+    </p:extLst>
+  </p:cSld>
+  <p:clrMapOvr>
+    <a:masterClrMapping/>
+  </p:clrMapOvr>
+</p:sld>
+</file>
+
+<file path=ppt/slides/slide18.xml><?xml version="1.0" encoding="utf-8"?>
+<p:sld xmlns:a="http://schemas.openxmlformats.org/drawingml/2006/main" xmlns:r="http://schemas.openxmlformats.org/officeDocument/2006/relationships" xmlns:p="http://schemas.openxmlformats.org/presentationml/2006/main">
+  <p:cSld>
+    <p:spTree>
+      <p:nvGrpSpPr>
+        <p:cNvPr id="1" name=""/>
+        <p:cNvGrpSpPr/>
+        <p:nvPr/>
+      </p:nvGrpSpPr>
+      <p:grpSpPr>
+        <a:xfrm>
+          <a:off x="0" y="0"/>
+          <a:ext cx="0" cy="0"/>
+          <a:chOff x="0" y="0"/>
+          <a:chExt cx="0" cy="0"/>
+        </a:xfrm>
+      </p:grpSpPr>
+      <p:sp>
+        <p:nvSpPr>
+          <p:cNvPr id="2" name="Title 1">
+            <a:extLst>
+              <a:ext uri="{FF2B5EF4-FFF2-40B4-BE49-F238E27FC236}">
                 <a16:creationId xmlns:a16="http://schemas.microsoft.com/office/drawing/2014/main" id="{1DA4FD9C-0575-4672-BDCF-805449EFAC7C}"/>
               </a:ext>
             </a:extLst>
@@ -8918,7 +10223,7 @@
 </p:sld>
 </file>
 
-<file path=ppt/slides/slide18.xml><?xml version="1.0" encoding="utf-8"?>
+<file path=ppt/slides/slide19.xml><?xml version="1.0" encoding="utf-8"?>
 <p:sld xmlns:a="http://schemas.openxmlformats.org/drawingml/2006/main" xmlns:r="http://schemas.openxmlformats.org/officeDocument/2006/relationships" xmlns:p="http://schemas.openxmlformats.org/presentationml/2006/main">
   <p:cSld>
     <p:spTree>
@@ -9547,7 +10852,7 @@
         <p:spPr/>
         <p:txBody>
           <a:bodyPr>
-            <a:normAutofit fontScale="85000" lnSpcReduction="10000"/>
+            <a:normAutofit fontScale="92500" lnSpcReduction="10000"/>
           </a:bodyPr>
           <a:lstStyle/>
           <a:p>
@@ -9557,29 +10862,28 @@
                 <a:ea typeface="Yu Gothic" panose="020B0400000000000000" pitchFamily="34" charset="-128"/>
                 <a:sym typeface="Wingdings" panose="05000000000000000000" pitchFamily="2" charset="2"/>
               </a:rPr>
-              <a:t>Fixed bug and re-implemented pipeline</a:t>
-            </a:r>
-          </a:p>
-          <a:p>
-            <a:pPr lvl="1"/>
+              <a:t>Decreased step size during MLE</a:t>
+            </a:r>
+          </a:p>
+          <a:p>
             <a:r>
               <a:rPr lang="en-US" dirty="0">
                 <a:latin typeface="Yu Gothic" panose="020B0400000000000000" pitchFamily="34" charset="-128"/>
                 <a:ea typeface="Yu Gothic" panose="020B0400000000000000" pitchFamily="34" charset="-128"/>
                 <a:sym typeface="Wingdings" panose="05000000000000000000" pitchFamily="2" charset="2"/>
               </a:rPr>
-              <a:t>TLDR part of the pipeline is in python2, and part of it is in python3 which messes with some data structures, particularly when used for string manipulation</a:t>
-            </a:r>
-          </a:p>
-          <a:p>
-            <a:pPr lvl="2"/>
+              <a:t>Constrained parameter boundaries to more closely match what we see in Cornejo</a:t>
+            </a:r>
+          </a:p>
+          <a:p>
+            <a:pPr lvl="1"/>
             <a:r>
               <a:rPr lang="en-US" dirty="0">
                 <a:latin typeface="Yu Gothic" panose="020B0400000000000000" pitchFamily="34" charset="-128"/>
                 <a:ea typeface="Yu Gothic" panose="020B0400000000000000" pitchFamily="34" charset="-128"/>
                 <a:sym typeface="Wingdings" panose="05000000000000000000" pitchFamily="2" charset="2"/>
               </a:rPr>
-              <a:t>Resulted in some technically not-allowed SFS’s, i.e., data in masked sites.</a:t>
+              <a:t>Log likelihood decreased for all models, species</a:t>
             </a:r>
           </a:p>
           <a:p>
@@ -9590,141 +10894,34 @@
                 <a:ea typeface="Yu Gothic" panose="020B0400000000000000" pitchFamily="34" charset="-128"/>
                 <a:sym typeface="Wingdings" panose="05000000000000000000" pitchFamily="2" charset="2"/>
               </a:rPr>
-              <a:t>I believe that sparsity of data, e.g., in P. </a:t>
-            </a:r>
-            <a:r>
-              <a:rPr lang="en-US" dirty="0" err="1">
+              <a:t>Ignore guesses with params at boundaries</a:t>
+            </a:r>
+          </a:p>
+          <a:p>
+            <a:pPr lvl="1"/>
+            <a:r>
+              <a:rPr lang="en-US" dirty="0">
+                <a:solidFill>
+                  <a:srgbClr val="FF0000"/>
+                </a:solidFill>
                 <a:latin typeface="Yu Gothic" panose="020B0400000000000000" pitchFamily="34" charset="-128"/>
                 <a:ea typeface="Yu Gothic" panose="020B0400000000000000" pitchFamily="34" charset="-128"/>
                 <a:sym typeface="Wingdings" panose="05000000000000000000" pitchFamily="2" charset="2"/>
               </a:rPr>
-              <a:t>copri</a:t>
-            </a:r>
+              <a:t>Log likelihood appears to be extremely flat, i.e., very different estimates have similar likelihoods</a:t>
+            </a:r>
+          </a:p>
+          <a:p>
             <a:r>
               <a:rPr lang="en-US" dirty="0">
+                <a:solidFill>
+                  <a:srgbClr val="FF0000"/>
+                </a:solidFill>
                 <a:latin typeface="Yu Gothic" panose="020B0400000000000000" pitchFamily="34" charset="-128"/>
                 <a:ea typeface="Yu Gothic" panose="020B0400000000000000" pitchFamily="34" charset="-128"/>
                 <a:sym typeface="Wingdings" panose="05000000000000000000" pitchFamily="2" charset="2"/>
               </a:rPr>
-              <a:t>, is not due to this bug.</a:t>
-            </a:r>
-          </a:p>
-          <a:p>
-            <a:pPr lvl="1"/>
-            <a:r>
-              <a:rPr lang="en-US" dirty="0">
-                <a:latin typeface="Yu Gothic" panose="020B0400000000000000" pitchFamily="34" charset="-128"/>
-                <a:ea typeface="Yu Gothic" panose="020B0400000000000000" pitchFamily="34" charset="-128"/>
-                <a:sym typeface="Wingdings" panose="05000000000000000000" pitchFamily="2" charset="2"/>
-              </a:rPr>
-              <a:t>Inference performance has either improved or stayed the same in terms of log-likelihood, but computational performance has worsened, e.g., computational time.</a:t>
-            </a:r>
-          </a:p>
-          <a:p>
-            <a:pPr lvl="2"/>
-            <a:r>
-              <a:rPr lang="en-US" dirty="0">
-                <a:latin typeface="Yu Gothic" panose="020B0400000000000000" pitchFamily="34" charset="-128"/>
-                <a:ea typeface="Yu Gothic" panose="020B0400000000000000" pitchFamily="34" charset="-128"/>
-                <a:sym typeface="Wingdings" panose="05000000000000000000" pitchFamily="2" charset="2"/>
-              </a:rPr>
-              <a:t>Inference for different models is now parallelized so that it runs in a reasonable timeframe.</a:t>
-            </a:r>
-          </a:p>
-          <a:p>
-            <a:pPr lvl="1"/>
-            <a:r>
-              <a:rPr lang="en-US" dirty="0">
-                <a:latin typeface="Yu Gothic" panose="020B0400000000000000" pitchFamily="34" charset="-128"/>
-                <a:ea typeface="Yu Gothic" panose="020B0400000000000000" pitchFamily="34" charset="-128"/>
-                <a:sym typeface="Wingdings" panose="05000000000000000000" pitchFamily="2" charset="2"/>
-              </a:rPr>
-              <a:t>Initial params and boundaries were changed.</a:t>
-            </a:r>
-          </a:p>
-          <a:p>
-            <a:r>
-              <a:rPr lang="en-US" dirty="0">
-                <a:latin typeface="Yu Gothic" panose="020B0400000000000000" pitchFamily="34" charset="-128"/>
-                <a:ea typeface="Yu Gothic" panose="020B0400000000000000" pitchFamily="34" charset="-128"/>
-                <a:sym typeface="Wingdings" panose="05000000000000000000" pitchFamily="2" charset="2"/>
-              </a:rPr>
-              <a:t>Reran </a:t>
-            </a:r>
-            <a:r>
-              <a:rPr lang="en-US" dirty="0" err="1">
-                <a:latin typeface="Yu Gothic" panose="020B0400000000000000" pitchFamily="34" charset="-128"/>
-                <a:ea typeface="Yu Gothic" panose="020B0400000000000000" pitchFamily="34" charset="-128"/>
-                <a:sym typeface="Wingdings" panose="05000000000000000000" pitchFamily="2" charset="2"/>
-              </a:rPr>
-              <a:t>Dadi</a:t>
-            </a:r>
-            <a:r>
-              <a:rPr lang="en-US" dirty="0">
-                <a:latin typeface="Yu Gothic" panose="020B0400000000000000" pitchFamily="34" charset="-128"/>
-                <a:ea typeface="Yu Gothic" panose="020B0400000000000000" pitchFamily="34" charset="-128"/>
-                <a:sym typeface="Wingdings" panose="05000000000000000000" pitchFamily="2" charset="2"/>
-              </a:rPr>
-              <a:t> + computed expected </a:t>
-            </a:r>
-            <a:r>
-              <a:rPr lang="en-US" dirty="0" err="1">
-                <a:latin typeface="Yu Gothic" panose="020B0400000000000000" pitchFamily="34" charset="-128"/>
-                <a:ea typeface="Yu Gothic" panose="020B0400000000000000" pitchFamily="34" charset="-128"/>
-                <a:sym typeface="Wingdings" panose="05000000000000000000" pitchFamily="2" charset="2"/>
-              </a:rPr>
-              <a:t>sfs</a:t>
-            </a:r>
-            <a:r>
-              <a:rPr lang="en-US" dirty="0">
-                <a:latin typeface="Yu Gothic" panose="020B0400000000000000" pitchFamily="34" charset="-128"/>
-                <a:ea typeface="Yu Gothic" panose="020B0400000000000000" pitchFamily="34" charset="-128"/>
-                <a:sym typeface="Wingdings" panose="05000000000000000000" pitchFamily="2" charset="2"/>
-              </a:rPr>
-              <a:t> on </a:t>
-            </a:r>
-            <a:r>
-              <a:rPr lang="en-US" i="1" dirty="0">
-                <a:latin typeface="Yu Gothic" panose="020B0400000000000000" pitchFamily="34" charset="-128"/>
-                <a:ea typeface="Yu Gothic" panose="020B0400000000000000" pitchFamily="34" charset="-128"/>
-                <a:sym typeface="Wingdings" panose="05000000000000000000" pitchFamily="2" charset="2"/>
-              </a:rPr>
-              <a:t>non-bugged</a:t>
-            </a:r>
-            <a:r>
-              <a:rPr lang="en-US" dirty="0">
-                <a:latin typeface="Yu Gothic" panose="020B0400000000000000" pitchFamily="34" charset="-128"/>
-                <a:ea typeface="Yu Gothic" panose="020B0400000000000000" pitchFamily="34" charset="-128"/>
-                <a:sym typeface="Wingdings" panose="05000000000000000000" pitchFamily="2" charset="2"/>
-              </a:rPr>
-              <a:t> </a:t>
-            </a:r>
-            <a:r>
-              <a:rPr lang="en-US" dirty="0" err="1">
-                <a:latin typeface="Yu Gothic" panose="020B0400000000000000" pitchFamily="34" charset="-128"/>
-                <a:ea typeface="Yu Gothic" panose="020B0400000000000000" pitchFamily="34" charset="-128"/>
-                <a:sym typeface="Wingdings" panose="05000000000000000000" pitchFamily="2" charset="2"/>
-              </a:rPr>
-              <a:t>sfs’s</a:t>
-            </a:r>
-            <a:r>
-              <a:rPr lang="en-US" dirty="0">
-                <a:latin typeface="Yu Gothic" panose="020B0400000000000000" pitchFamily="34" charset="-128"/>
-                <a:ea typeface="Yu Gothic" panose="020B0400000000000000" pitchFamily="34" charset="-128"/>
-                <a:sym typeface="Wingdings" panose="05000000000000000000" pitchFamily="2" charset="2"/>
-              </a:rPr>
-              <a:t>.</a:t>
-            </a:r>
-          </a:p>
-          <a:p>
-            <a:pPr lvl="1"/>
-            <a:r>
-              <a:rPr lang="en-US" dirty="0">
-                <a:latin typeface="Yu Gothic" panose="020B0400000000000000" pitchFamily="34" charset="-128"/>
-                <a:ea typeface="Yu Gothic" panose="020B0400000000000000" pitchFamily="34" charset="-128"/>
-                <a:sym typeface="Wingdings" panose="05000000000000000000" pitchFamily="2" charset="2"/>
-              </a:rPr>
-              <a:t>Some results still pending.</a:t>
+              <a:t>I took a look at fixing the time of expansion and only inferring population size, but the log likelihood went to -1000000000.</a:t>
             </a:r>
           </a:p>
           <a:p>
@@ -9965,7 +11162,7 @@
                   <a:srgbClr val="FF0000"/>
                 </a:solidFill>
               </a:rPr>
-              <a:t>15</a:t>
+              <a:t>25</a:t>
             </a:r>
             <a:r>
               <a:rPr lang="en-US" dirty="0"/>
@@ -10010,6 +11207,17 @@
             <a:r>
               <a:rPr lang="en-US" dirty="0"/>
               <a:t>Output log likelihood and model params of best initial guess + iterations</a:t>
+            </a:r>
+          </a:p>
+          <a:p>
+            <a:pPr lvl="2"/>
+            <a:r>
+              <a:rPr lang="en-US" dirty="0">
+                <a:solidFill>
+                  <a:srgbClr val="FF0000"/>
+                </a:solidFill>
+              </a:rPr>
+              <a:t>Ignore guesses with params at boundaries</a:t>
             </a:r>
           </a:p>
         </p:txBody>
@@ -10099,8 +11307,8 @@
         </p:blipFill>
         <p:spPr>
           <a:xfrm>
-            <a:off x="245805" y="1351179"/>
-            <a:ext cx="8186891" cy="3373375"/>
+            <a:off x="245806" y="1351180"/>
+            <a:ext cx="6850648" cy="2822782"/>
           </a:xfrm>
           <a:prstGeom prst="rect">
             <a:avLst/>
@@ -10123,14 +11331,14 @@
             <p:ph idx="1"/>
             <p:extLst>
               <p:ext uri="{D42A27DB-BD31-4B8C-83A1-F6EECF244321}">
-                <p14:modId xmlns:p14="http://schemas.microsoft.com/office/powerpoint/2010/main" val="2376324388"/>
+                <p14:modId xmlns:p14="http://schemas.microsoft.com/office/powerpoint/2010/main" val="1135453908"/>
               </p:ext>
             </p:extLst>
           </p:nvPr>
         </p:nvGraphicFramePr>
         <p:xfrm>
-          <a:off x="838200" y="4539094"/>
-          <a:ext cx="10515600" cy="2225040"/>
+          <a:off x="838200" y="4173962"/>
+          <a:ext cx="10515600" cy="2595880"/>
         </p:xfrm>
         <a:graphic>
           <a:graphicData uri="http://schemas.openxmlformats.org/drawingml/2006/table">
@@ -10268,7 +11476,7 @@
                     <a:p>
                       <a:r>
                         <a:rPr lang="en-US" dirty="0"/>
-                        <a:t>-120.722757756</a:t>
+                        <a:t>-208.162572957</a:t>
                       </a:r>
                     </a:p>
                   </a:txBody>
@@ -10299,7 +11507,7 @@
                     <a:p>
                       <a:r>
                         <a:rPr lang="en-US" dirty="0"/>
-                        <a:t>-120.726052275</a:t>
+                        <a:t>-208.145694409</a:t>
                       </a:r>
                       <a:endParaRPr lang="en-US" dirty="0">
                         <a:highlight>
@@ -10317,7 +11525,7 @@
                     <a:p>
                       <a:r>
                         <a:rPr lang="en-US" dirty="0"/>
-                        <a:t>-121.995339345</a:t>
+                        <a:t>-208.080701909</a:t>
                       </a:r>
                     </a:p>
                   </a:txBody>
@@ -10336,6 +11544,88 @@
                     <a:lstStyle/>
                     <a:p>
                       <a:r>
+                        <a:rPr lang="en-US" dirty="0"/>
+                        <a:t>Theta</a:t>
+                      </a:r>
+                    </a:p>
+                  </a:txBody>
+                  <a:tcPr/>
+                </a:tc>
+                <a:tc>
+                  <a:txBody>
+                    <a:bodyPr/>
+                    <a:lstStyle/>
+                    <a:p>
+                      <a:r>
+                        <a:rPr lang="en-US" dirty="0"/>
+                        <a:t>2511.2512867</a:t>
+                      </a:r>
+                    </a:p>
+                  </a:txBody>
+                  <a:tcPr/>
+                </a:tc>
+                <a:tc>
+                  <a:txBody>
+                    <a:bodyPr/>
+                    <a:lstStyle/>
+                    <a:p>
+                      <a:r>
+                        <a:rPr lang="en-US" dirty="0"/>
+                        <a:t>2511.26053481</a:t>
+                      </a:r>
+                      <a:endParaRPr lang="en-US" dirty="0">
+                        <a:highlight>
+                          <a:srgbClr val="FFFF00"/>
+                        </a:highlight>
+                      </a:endParaRPr>
+                    </a:p>
+                  </a:txBody>
+                  <a:tcPr/>
+                </a:tc>
+                <a:tc>
+                  <a:txBody>
+                    <a:bodyPr/>
+                    <a:lstStyle/>
+                    <a:p>
+                      <a:r>
+                        <a:rPr lang="en-US" dirty="0"/>
+                        <a:t>2511.23182071</a:t>
+                      </a:r>
+                      <a:endParaRPr lang="en-US" dirty="0">
+                        <a:highlight>
+                          <a:srgbClr val="FFFF00"/>
+                        </a:highlight>
+                      </a:endParaRPr>
+                    </a:p>
+                  </a:txBody>
+                  <a:tcPr/>
+                </a:tc>
+                <a:tc>
+                  <a:txBody>
+                    <a:bodyPr/>
+                    <a:lstStyle/>
+                    <a:p>
+                      <a:r>
+                        <a:rPr lang="en-US" dirty="0"/>
+                        <a:t>2511.15683203</a:t>
+                      </a:r>
+                    </a:p>
+                  </a:txBody>
+                  <a:tcPr/>
+                </a:tc>
+                <a:extLst>
+                  <a:ext uri="{0D108BD9-81ED-4DB2-BD59-A6C34878D82A}">
+                    <a16:rowId xmlns:a16="http://schemas.microsoft.com/office/drawing/2014/main" val="3581132329"/>
+                  </a:ext>
+                </a:extLst>
+              </a:tr>
+              <a:tr h="370840">
+                <a:tc>
+                  <a:txBody>
+                    <a:bodyPr/>
+                    <a:lstStyle/>
+                    <a:p>
+                      <a:r>
                         <a:rPr lang="en-US" dirty="0" err="1"/>
                         <a:t>Nu_a</a:t>
                       </a:r>
@@ -10351,46 +11641,46 @@
                     <a:p>
                       <a:r>
                         <a:rPr lang="en-US" dirty="0"/>
-                        <a:t>1.62764391</a:t>
-                      </a:r>
-                    </a:p>
-                  </a:txBody>
-                  <a:tcPr/>
-                </a:tc>
-                <a:tc>
-                  <a:txBody>
-                    <a:bodyPr/>
-                    <a:lstStyle/>
-                    <a:p>
-                      <a:r>
-                        <a:rPr lang="en-US" dirty="0"/>
-                        <a:t>1.49516307</a:t>
-                      </a:r>
-                    </a:p>
-                  </a:txBody>
-                  <a:tcPr/>
-                </a:tc>
-                <a:tc>
-                  <a:txBody>
-                    <a:bodyPr/>
-                    <a:lstStyle/>
-                    <a:p>
-                      <a:r>
-                        <a:rPr lang="en-US" dirty="0"/>
-                        <a:t>1.07053664</a:t>
-                      </a:r>
-                    </a:p>
-                  </a:txBody>
-                  <a:tcPr/>
-                </a:tc>
-                <a:tc>
-                  <a:txBody>
-                    <a:bodyPr/>
-                    <a:lstStyle/>
-                    <a:p>
-                      <a:r>
-                        <a:rPr lang="en-US" dirty="0"/>
-                        <a:t>2.64925027</a:t>
+                        <a:t>4.09650015e+00</a:t>
+                      </a:r>
+                    </a:p>
+                  </a:txBody>
+                  <a:tcPr/>
+                </a:tc>
+                <a:tc>
+                  <a:txBody>
+                    <a:bodyPr/>
+                    <a:lstStyle/>
+                    <a:p>
+                      <a:r>
+                        <a:rPr lang="en-US" dirty="0"/>
+                        <a:t>5.16608531e+00</a:t>
+                      </a:r>
+                    </a:p>
+                  </a:txBody>
+                  <a:tcPr/>
+                </a:tc>
+                <a:tc>
+                  <a:txBody>
+                    <a:bodyPr/>
+                    <a:lstStyle/>
+                    <a:p>
+                      <a:r>
+                        <a:rPr lang="en-US" dirty="0"/>
+                        <a:t>7.78137069e-02</a:t>
+                      </a:r>
+                    </a:p>
+                  </a:txBody>
+                  <a:tcPr/>
+                </a:tc>
+                <a:tc>
+                  <a:txBody>
+                    <a:bodyPr/>
+                    <a:lstStyle/>
+                    <a:p>
+                      <a:r>
+                        <a:rPr lang="en-US" dirty="0"/>
+                        <a:t>1.36762028e+00</a:t>
                       </a:r>
                     </a:p>
                   </a:txBody>
@@ -10450,20 +11740,20 @@
                     <a:p>
                       <a:r>
                         <a:rPr lang="en-US" dirty="0"/>
-                        <a:t>1.63127485</a:t>
-                      </a:r>
-                    </a:p>
-                  </a:txBody>
-                  <a:tcPr/>
-                </a:tc>
-                <a:tc>
-                  <a:txBody>
-                    <a:bodyPr/>
-                    <a:lstStyle/>
-                    <a:p>
-                      <a:r>
-                        <a:rPr lang="en-US" dirty="0"/>
-                        <a:t>1.49440752</a:t>
+                        <a:t>4.45424563e+00</a:t>
+                      </a:r>
+                    </a:p>
+                  </a:txBody>
+                  <a:tcPr/>
+                </a:tc>
+                <a:tc>
+                  <a:txBody>
+                    <a:bodyPr/>
+                    <a:lstStyle/>
+                    <a:p>
+                      <a:r>
+                        <a:rPr lang="en-US" dirty="0"/>
+                        <a:t>3.41644642e+00</a:t>
                       </a:r>
                     </a:p>
                   </a:txBody>
@@ -10496,46 +11786,46 @@
                     <a:p>
                       <a:r>
                         <a:rPr lang="en-US" dirty="0"/>
-                        <a:t>1.09100781</a:t>
-                      </a:r>
-                    </a:p>
-                  </a:txBody>
-                  <a:tcPr/>
-                </a:tc>
-                <a:tc>
-                  <a:txBody>
-                    <a:bodyPr/>
-                    <a:lstStyle/>
-                    <a:p>
-                      <a:r>
-                        <a:rPr lang="en-US" dirty="0"/>
-                        <a:t>0.44708506</a:t>
-                      </a:r>
-                    </a:p>
-                  </a:txBody>
-                  <a:tcPr/>
-                </a:tc>
-                <a:tc>
-                  <a:txBody>
-                    <a:bodyPr/>
-                    <a:lstStyle/>
-                    <a:p>
-                      <a:r>
-                        <a:rPr lang="en-US" dirty="0"/>
-                        <a:t>0.98098777</a:t>
-                      </a:r>
-                    </a:p>
-                  </a:txBody>
-                  <a:tcPr/>
-                </a:tc>
-                <a:tc>
-                  <a:txBody>
-                    <a:bodyPr/>
-                    <a:lstStyle/>
-                    <a:p>
-                      <a:r>
-                        <a:rPr lang="en-US" dirty="0"/>
-                        <a:t>0.00631432</a:t>
+                        <a:t>3.35256629e-06</a:t>
+                      </a:r>
+                    </a:p>
+                  </a:txBody>
+                  <a:tcPr/>
+                </a:tc>
+                <a:tc>
+                  <a:txBody>
+                    <a:bodyPr/>
+                    <a:lstStyle/>
+                    <a:p>
+                      <a:r>
+                        <a:rPr lang="en-US" dirty="0"/>
+                        <a:t>2.36745622e-06</a:t>
+                      </a:r>
+                    </a:p>
+                  </a:txBody>
+                  <a:tcPr/>
+                </a:tc>
+                <a:tc>
+                  <a:txBody>
+                    <a:bodyPr/>
+                    <a:lstStyle/>
+                    <a:p>
+                      <a:r>
+                        <a:rPr lang="en-US" dirty="0"/>
+                        <a:t>5.00359433e-06</a:t>
+                      </a:r>
+                    </a:p>
+                  </a:txBody>
+                  <a:tcPr/>
+                </a:tc>
+                <a:tc>
+                  <a:txBody>
+                    <a:bodyPr/>
+                    <a:lstStyle/>
+                    <a:p>
+                      <a:r>
+                        <a:rPr lang="en-US" dirty="0"/>
+                        <a:t>2.74607621e-06</a:t>
                       </a:r>
                     </a:p>
                   </a:txBody>
@@ -10607,7 +11897,7 @@
                     <a:p>
                       <a:r>
                         <a:rPr lang="en-US" dirty="0"/>
-                        <a:t>0.43254745</a:t>
+                        <a:t>1.19722591e-05</a:t>
                       </a:r>
                     </a:p>
                   </a:txBody>
@@ -10801,8 +12091,8 @@
         </p:blipFill>
         <p:spPr>
           <a:xfrm>
-            <a:off x="256878" y="1428443"/>
-            <a:ext cx="7420897" cy="3002841"/>
+            <a:off x="256879" y="1428443"/>
+            <a:ext cx="6403002" cy="2590953"/>
           </a:xfrm>
           <a:prstGeom prst="rect">
             <a:avLst/>
@@ -10825,14 +12115,14 @@
             <p:ph idx="1"/>
             <p:extLst>
               <p:ext uri="{D42A27DB-BD31-4B8C-83A1-F6EECF244321}">
-                <p14:modId xmlns:p14="http://schemas.microsoft.com/office/powerpoint/2010/main" val="151831902"/>
+                <p14:modId xmlns:p14="http://schemas.microsoft.com/office/powerpoint/2010/main" val="3742453736"/>
               </p:ext>
             </p:extLst>
           </p:nvPr>
         </p:nvGraphicFramePr>
         <p:xfrm>
-          <a:off x="838200" y="4431284"/>
-          <a:ext cx="10515600" cy="2225040"/>
+          <a:off x="838200" y="4233011"/>
+          <a:ext cx="10515600" cy="2595880"/>
         </p:xfrm>
         <a:graphic>
           <a:graphicData uri="http://schemas.openxmlformats.org/drawingml/2006/table">
@@ -10970,20 +12260,20 @@
                     <a:p>
                       <a:r>
                         <a:rPr lang="en-US" dirty="0"/>
-                        <a:t>-145.678269157</a:t>
-                      </a:r>
-                    </a:p>
-                  </a:txBody>
-                  <a:tcPr/>
-                </a:tc>
-                <a:tc>
-                  <a:txBody>
-                    <a:bodyPr/>
-                    <a:lstStyle/>
-                    <a:p>
-                      <a:r>
-                        <a:rPr lang="en-US" dirty="0"/>
-                        <a:t>-142.249802587</a:t>
+                        <a:t>-223.566950386</a:t>
+                      </a:r>
+                    </a:p>
+                  </a:txBody>
+                  <a:tcPr/>
+                </a:tc>
+                <a:tc>
+                  <a:txBody>
+                    <a:bodyPr/>
+                    <a:lstStyle/>
+                    <a:p>
+                      <a:r>
+                        <a:rPr lang="en-US" dirty="0"/>
+                        <a:t>-223.576366468</a:t>
                       </a:r>
                       <a:endParaRPr lang="en-US" dirty="0">
                         <a:highlight>
@@ -11001,7 +12291,7 @@
                     <a:p>
                       <a:r>
                         <a:rPr lang="en-US" dirty="0"/>
-                        <a:t>-141.923362261</a:t>
+                        <a:t>-223.545209485</a:t>
                       </a:r>
                       <a:endParaRPr lang="en-US" dirty="0">
                         <a:highlight>
@@ -11019,7 +12309,7 @@
                     <a:p>
                       <a:r>
                         <a:rPr lang="en-US" dirty="0"/>
-                        <a:t>-141.148031575</a:t>
+                        <a:t>-223.529434504</a:t>
                       </a:r>
                     </a:p>
                   </a:txBody>
@@ -11038,6 +12328,88 @@
                     <a:lstStyle/>
                     <a:p>
                       <a:r>
+                        <a:rPr lang="en-US" dirty="0"/>
+                        <a:t>Theta</a:t>
+                      </a:r>
+                    </a:p>
+                  </a:txBody>
+                  <a:tcPr/>
+                </a:tc>
+                <a:tc>
+                  <a:txBody>
+                    <a:bodyPr/>
+                    <a:lstStyle/>
+                    <a:p>
+                      <a:r>
+                        <a:rPr lang="en-US" dirty="0"/>
+                        <a:t>2415.2446717</a:t>
+                      </a:r>
+                    </a:p>
+                  </a:txBody>
+                  <a:tcPr/>
+                </a:tc>
+                <a:tc>
+                  <a:txBody>
+                    <a:bodyPr/>
+                    <a:lstStyle/>
+                    <a:p>
+                      <a:r>
+                        <a:rPr lang="en-US" dirty="0"/>
+                        <a:t>2415.25855658</a:t>
+                      </a:r>
+                      <a:endParaRPr lang="en-US" dirty="0">
+                        <a:highlight>
+                          <a:srgbClr val="FFFF00"/>
+                        </a:highlight>
+                      </a:endParaRPr>
+                    </a:p>
+                  </a:txBody>
+                  <a:tcPr/>
+                </a:tc>
+                <a:tc>
+                  <a:txBody>
+                    <a:bodyPr/>
+                    <a:lstStyle/>
+                    <a:p>
+                      <a:r>
+                        <a:rPr lang="en-US" dirty="0"/>
+                        <a:t>2415.2126046</a:t>
+                      </a:r>
+                      <a:endParaRPr lang="en-US" dirty="0">
+                        <a:highlight>
+                          <a:srgbClr val="FFFF00"/>
+                        </a:highlight>
+                      </a:endParaRPr>
+                    </a:p>
+                  </a:txBody>
+                  <a:tcPr/>
+                </a:tc>
+                <a:tc>
+                  <a:txBody>
+                    <a:bodyPr/>
+                    <a:lstStyle/>
+                    <a:p>
+                      <a:r>
+                        <a:rPr lang="en-US" dirty="0"/>
+                        <a:t>2415.18932839</a:t>
+                      </a:r>
+                    </a:p>
+                  </a:txBody>
+                  <a:tcPr/>
+                </a:tc>
+                <a:extLst>
+                  <a:ext uri="{0D108BD9-81ED-4DB2-BD59-A6C34878D82A}">
+                    <a16:rowId xmlns:a16="http://schemas.microsoft.com/office/drawing/2014/main" val="2621229367"/>
+                  </a:ext>
+                </a:extLst>
+              </a:tr>
+              <a:tr h="370840">
+                <a:tc>
+                  <a:txBody>
+                    <a:bodyPr/>
+                    <a:lstStyle/>
+                    <a:p>
+                      <a:r>
                         <a:rPr lang="en-US" dirty="0" err="1"/>
                         <a:t>Nu_a</a:t>
                       </a:r>
@@ -11053,46 +12425,46 @@
                     <a:p>
                       <a:r>
                         <a:rPr lang="en-US" dirty="0"/>
-                        <a:t>2.02416132</a:t>
-                      </a:r>
-                    </a:p>
-                  </a:txBody>
-                  <a:tcPr/>
-                </a:tc>
-                <a:tc>
-                  <a:txBody>
-                    <a:bodyPr/>
-                    <a:lstStyle/>
-                    <a:p>
-                      <a:r>
-                        <a:rPr lang="en-US" dirty="0"/>
-                        <a:t>12.62499552</a:t>
-                      </a:r>
-                    </a:p>
-                  </a:txBody>
-                  <a:tcPr/>
-                </a:tc>
-                <a:tc>
-                  <a:txBody>
-                    <a:bodyPr/>
-                    <a:lstStyle/>
-                    <a:p>
-                      <a:r>
-                        <a:rPr lang="en-US" dirty="0"/>
-                        <a:t>2.24845827</a:t>
-                      </a:r>
-                    </a:p>
-                  </a:txBody>
-                  <a:tcPr/>
-                </a:tc>
-                <a:tc>
-                  <a:txBody>
-                    <a:bodyPr/>
-                    <a:lstStyle/>
-                    <a:p>
-                      <a:r>
-                        <a:rPr lang="en-US" dirty="0"/>
-                        <a:t>3.24358033</a:t>
+                        <a:t>4.22004079e+00</a:t>
+                      </a:r>
+                    </a:p>
+                  </a:txBody>
+                  <a:tcPr/>
+                </a:tc>
+                <a:tc>
+                  <a:txBody>
+                    <a:bodyPr/>
+                    <a:lstStyle/>
+                    <a:p>
+                      <a:r>
+                        <a:rPr lang="en-US" dirty="0"/>
+                        <a:t>5.06866276e-02</a:t>
+                      </a:r>
+                    </a:p>
+                  </a:txBody>
+                  <a:tcPr/>
+                </a:tc>
+                <a:tc>
+                  <a:txBody>
+                    <a:bodyPr/>
+                    <a:lstStyle/>
+                    <a:p>
+                      <a:r>
+                        <a:rPr lang="en-US" dirty="0"/>
+                        <a:t>1.48991313e-01</a:t>
+                      </a:r>
+                    </a:p>
+                  </a:txBody>
+                  <a:tcPr/>
+                </a:tc>
+                <a:tc>
+                  <a:txBody>
+                    <a:bodyPr/>
+                    <a:lstStyle/>
+                    <a:p>
+                      <a:r>
+                        <a:rPr lang="en-US" dirty="0"/>
+                        <a:t>8.72664505e-01</a:t>
                       </a:r>
                     </a:p>
                   </a:txBody>
@@ -11152,20 +12524,20 @@
                     <a:p>
                       <a:r>
                         <a:rPr lang="en-US" dirty="0"/>
-                        <a:t>1.79912316</a:t>
-                      </a:r>
-                    </a:p>
-                  </a:txBody>
-                  <a:tcPr/>
-                </a:tc>
-                <a:tc>
-                  <a:txBody>
-                    <a:bodyPr/>
-                    <a:lstStyle/>
-                    <a:p>
-                      <a:r>
-                        <a:rPr lang="en-US" dirty="0"/>
-                        <a:t>1.73262388</a:t>
+                        <a:t>1.09132625e-01</a:t>
+                      </a:r>
+                    </a:p>
+                  </a:txBody>
+                  <a:tcPr/>
+                </a:tc>
+                <a:tc>
+                  <a:txBody>
+                    <a:bodyPr/>
+                    <a:lstStyle/>
+                    <a:p>
+                      <a:r>
+                        <a:rPr lang="en-US" dirty="0"/>
+                        <a:t>2.95430914e+00</a:t>
                       </a:r>
                     </a:p>
                   </a:txBody>
@@ -11198,46 +12570,46 @@
                     <a:p>
                       <a:r>
                         <a:rPr lang="en-US" dirty="0"/>
-                        <a:t>3.17342171</a:t>
-                      </a:r>
-                    </a:p>
-                  </a:txBody>
-                  <a:tcPr/>
-                </a:tc>
-                <a:tc>
-                  <a:txBody>
-                    <a:bodyPr/>
-                    <a:lstStyle/>
-                    <a:p>
-                      <a:r>
-                        <a:rPr lang="en-US" dirty="0"/>
-                        <a:t>18.01177973</a:t>
-                      </a:r>
-                    </a:p>
-                  </a:txBody>
-                  <a:tcPr/>
-                </a:tc>
-                <a:tc>
-                  <a:txBody>
-                    <a:bodyPr/>
-                    <a:lstStyle/>
-                    <a:p>
-                      <a:r>
-                        <a:rPr lang="en-US" dirty="0"/>
-                        <a:t>1.23976291</a:t>
-                      </a:r>
-                    </a:p>
-                  </a:txBody>
-                  <a:tcPr/>
-                </a:tc>
-                <a:tc>
-                  <a:txBody>
-                    <a:bodyPr/>
-                    <a:lstStyle/>
-                    <a:p>
-                      <a:r>
-                        <a:rPr lang="en-US" dirty="0"/>
-                        <a:t>0.40179331</a:t>
+                        <a:t>2.87734872e-06</a:t>
+                      </a:r>
+                    </a:p>
+                  </a:txBody>
+                  <a:tcPr/>
+                </a:tc>
+                <a:tc>
+                  <a:txBody>
+                    <a:bodyPr/>
+                    <a:lstStyle/>
+                    <a:p>
+                      <a:r>
+                        <a:rPr lang="en-US" dirty="0"/>
+                        <a:t>7.64498992e-06</a:t>
+                      </a:r>
+                    </a:p>
+                  </a:txBody>
+                  <a:tcPr/>
+                </a:tc>
+                <a:tc>
+                  <a:txBody>
+                    <a:bodyPr/>
+                    <a:lstStyle/>
+                    <a:p>
+                      <a:r>
+                        <a:rPr lang="en-US" dirty="0"/>
+                        <a:t>1.64168424e-05</a:t>
+                      </a:r>
+                    </a:p>
+                  </a:txBody>
+                  <a:tcPr/>
+                </a:tc>
+                <a:tc>
+                  <a:txBody>
+                    <a:bodyPr/>
+                    <a:lstStyle/>
+                    <a:p>
+                      <a:r>
+                        <a:rPr lang="en-US" dirty="0"/>
+                        <a:t>1.61170089e-06</a:t>
                       </a:r>
                     </a:p>
                   </a:txBody>
@@ -11309,7 +12681,7 @@
                     <a:p>
                       <a:r>
                         <a:rPr lang="en-US" dirty="0"/>
-                        <a:t>0.54790132</a:t>
+                        <a:t>9.99437888e-06</a:t>
                       </a:r>
                     </a:p>
                   </a:txBody>
@@ -11508,7 +12880,7 @@
         <p:spPr>
           <a:xfrm>
             <a:off x="153870" y="1396409"/>
-            <a:ext cx="7272953" cy="3001130"/>
+            <a:ext cx="6942583" cy="2864805"/>
           </a:xfrm>
           <a:prstGeom prst="rect">
             <a:avLst/>
@@ -11531,14 +12903,14 @@
             <p:ph idx="1"/>
             <p:extLst>
               <p:ext uri="{D42A27DB-BD31-4B8C-83A1-F6EECF244321}">
-                <p14:modId xmlns:p14="http://schemas.microsoft.com/office/powerpoint/2010/main" val="822494882"/>
+                <p14:modId xmlns:p14="http://schemas.microsoft.com/office/powerpoint/2010/main" val="1651957334"/>
               </p:ext>
             </p:extLst>
           </p:nvPr>
         </p:nvGraphicFramePr>
         <p:xfrm>
-          <a:off x="828368" y="4397539"/>
-          <a:ext cx="10515600" cy="2225040"/>
+          <a:off x="838200" y="4261214"/>
+          <a:ext cx="10515600" cy="2590800"/>
         </p:xfrm>
         <a:graphic>
           <a:graphicData uri="http://schemas.openxmlformats.org/drawingml/2006/table">
@@ -11684,7 +13056,7 @@
                             <a:schemeClr val="tx1"/>
                           </a:solidFill>
                         </a:rPr>
-                        <a:t>-239.595010976</a:t>
+                        <a:t>-1722.56029913</a:t>
                       </a:r>
                     </a:p>
                   </a:txBody>
@@ -11701,7 +13073,7 @@
                             <a:schemeClr val="tx1"/>
                           </a:solidFill>
                         </a:rPr>
-                        <a:t>-283.836375864</a:t>
+                        <a:t>-1722.54653468</a:t>
                       </a:r>
                     </a:p>
                   </a:txBody>
@@ -11718,7 +13090,7 @@
                             <a:schemeClr val="tx1"/>
                           </a:solidFill>
                         </a:rPr>
-                        <a:t>--156.298283062</a:t>
+                        <a:t>-1722.52576571</a:t>
                       </a:r>
                     </a:p>
                   </a:txBody>
@@ -11738,7 +13110,7 @@
                           <a:ea typeface="+mn-ea"/>
                           <a:cs typeface="+mn-cs"/>
                         </a:rPr>
-                        <a:t>--239.803514655</a:t>
+                        <a:t>-1722.43277834</a:t>
                       </a:r>
                       <a:endParaRPr lang="en-US" dirty="0">
                         <a:solidFill>
@@ -11755,6 +13127,98 @@
                   </a:ext>
                 </a:extLst>
               </a:tr>
+              <a:tr h="286221">
+                <a:tc>
+                  <a:txBody>
+                    <a:bodyPr/>
+                    <a:lstStyle/>
+                    <a:p>
+                      <a:r>
+                        <a:rPr lang="en-US" dirty="0">
+                          <a:solidFill>
+                            <a:schemeClr val="tx1"/>
+                          </a:solidFill>
+                        </a:rPr>
+                        <a:t>Theta</a:t>
+                      </a:r>
+                    </a:p>
+                  </a:txBody>
+                  <a:tcPr/>
+                </a:tc>
+                <a:tc>
+                  <a:txBody>
+                    <a:bodyPr/>
+                    <a:lstStyle/>
+                    <a:p>
+                      <a:r>
+                        <a:rPr lang="en-US" dirty="0">
+                          <a:solidFill>
+                            <a:schemeClr val="tx1"/>
+                          </a:solidFill>
+                        </a:rPr>
+                        <a:t>2961.05778586</a:t>
+                      </a:r>
+                    </a:p>
+                  </a:txBody>
+                  <a:tcPr/>
+                </a:tc>
+                <a:tc>
+                  <a:txBody>
+                    <a:bodyPr/>
+                    <a:lstStyle/>
+                    <a:p>
+                      <a:r>
+                        <a:rPr lang="en-US" dirty="0">
+                          <a:solidFill>
+                            <a:schemeClr val="tx1"/>
+                          </a:solidFill>
+                        </a:rPr>
+                        <a:t>2961.04969561</a:t>
+                      </a:r>
+                    </a:p>
+                  </a:txBody>
+                  <a:tcPr/>
+                </a:tc>
+                <a:tc>
+                  <a:txBody>
+                    <a:bodyPr/>
+                    <a:lstStyle/>
+                    <a:p>
+                      <a:r>
+                        <a:rPr lang="en-US" dirty="0">
+                          <a:solidFill>
+                            <a:schemeClr val="tx1"/>
+                          </a:solidFill>
+                        </a:rPr>
+                        <a:t>2961.03748825</a:t>
+                      </a:r>
+                    </a:p>
+                  </a:txBody>
+                  <a:tcPr/>
+                </a:tc>
+                <a:tc>
+                  <a:txBody>
+                    <a:bodyPr/>
+                    <a:lstStyle/>
+                    <a:p>
+                      <a:r>
+                        <a:rPr lang="en-US" dirty="0">
+                          <a:solidFill>
+                            <a:schemeClr val="tx1"/>
+                          </a:solidFill>
+                        </a:rPr>
+                        <a:t>2960.98282718</a:t>
+                      </a:r>
+                    </a:p>
+                  </a:txBody>
+                  <a:tcPr/>
+                </a:tc>
+                <a:extLst>
+                  <a:ext uri="{0D108BD9-81ED-4DB2-BD59-A6C34878D82A}">
+                    <a16:rowId xmlns:a16="http://schemas.microsoft.com/office/drawing/2014/main" val="2458540633"/>
+                  </a:ext>
+                </a:extLst>
+              </a:tr>
               <a:tr h="370840">
                 <a:tc>
                   <a:txBody>
@@ -11789,7 +13253,7 @@
                             <a:schemeClr val="tx1"/>
                           </a:solidFill>
                         </a:rPr>
-                        <a:t>11.61457391</a:t>
+                        <a:t>5.32786573e+00</a:t>
                       </a:r>
                     </a:p>
                   </a:txBody>
@@ -11806,7 +13270,7 @@
                             <a:schemeClr val="tx1"/>
                           </a:solidFill>
                         </a:rPr>
-                        <a:t>12.85982032</a:t>
+                        <a:t>5.11933281e+00</a:t>
                       </a:r>
                     </a:p>
                   </a:txBody>
@@ -11823,7 +13287,7 @@
                             <a:schemeClr val="tx1"/>
                           </a:solidFill>
                         </a:rPr>
-                        <a:t>59.81554768</a:t>
+                        <a:t>1.11828810e-01</a:t>
                       </a:r>
                     </a:p>
                   </a:txBody>
@@ -11843,7 +13307,7 @@
                           <a:ea typeface="+mn-ea"/>
                           <a:cs typeface="+mn-cs"/>
                         </a:rPr>
-                        <a:t>10.31769069</a:t>
+                        <a:t>2.71539141e+00</a:t>
                       </a:r>
                       <a:endParaRPr lang="en-US" dirty="0">
                         <a:solidFill>
@@ -11928,7 +13392,7 @@
                             <a:schemeClr val="tx1"/>
                           </a:solidFill>
                         </a:rPr>
-                        <a:t>3.57118932</a:t>
+                        <a:t>2.75394940e+00</a:t>
                       </a:r>
                     </a:p>
                   </a:txBody>
@@ -11948,7 +13412,7 @@
                           <a:ea typeface="+mn-ea"/>
                           <a:cs typeface="+mn-cs"/>
                         </a:rPr>
-                        <a:t>12.07534007</a:t>
+                        <a:t>3.25585820e+00</a:t>
                       </a:r>
                       <a:endParaRPr lang="en-US" dirty="0">
                         <a:solidFill>
@@ -11994,7 +13458,7 @@
                             <a:schemeClr val="tx1"/>
                           </a:solidFill>
                         </a:rPr>
-                        <a:t>4.39995892</a:t>
+                        <a:t>2.42838887e-06</a:t>
                       </a:r>
                     </a:p>
                   </a:txBody>
@@ -12011,7 +13475,7 @@
                             <a:schemeClr val="tx1"/>
                           </a:solidFill>
                         </a:rPr>
-                        <a:t>5.26353859</a:t>
+                        <a:t>3.25098838e-06</a:t>
                       </a:r>
                     </a:p>
                   </a:txBody>
@@ -12028,7 +13492,7 @@
                             <a:schemeClr val="tx1"/>
                           </a:solidFill>
                         </a:rPr>
-                        <a:t>1.59972168</a:t>
+                        <a:t>5.60862901e-06</a:t>
                       </a:r>
                     </a:p>
                   </a:txBody>
@@ -12048,7 +13512,7 @@
                           <a:ea typeface="+mn-ea"/>
                           <a:cs typeface="+mn-cs"/>
                         </a:rPr>
-                        <a:t>0.90845072</a:t>
+                        <a:t>5.21114711e-06</a:t>
                       </a:r>
                       <a:endParaRPr lang="en-US" dirty="0">
                         <a:solidFill>
@@ -12148,7 +13612,7 @@
                           <a:ea typeface="+mn-ea"/>
                           <a:cs typeface="+mn-cs"/>
                         </a:rPr>
-                        <a:t>3.75907656</a:t>
+                        <a:t>6.79649776e-06</a:t>
                       </a:r>
                       <a:endParaRPr lang="en-US" dirty="0">
                         <a:solidFill>

</xml_diff>